<commit_message>
Final stuff ... 2.0
</commit_message>
<xml_diff>
--- a/Presentation/import_this.pptx
+++ b/Presentation/import_this.pptx
@@ -7,49 +7,53 @@
     <p:sldMasterId id="2147483858" r:id="rId3"/>
   </p:sldMasterIdLst>
   <p:notesMasterIdLst>
-    <p:notesMasterId r:id="rId36"/>
+    <p:notesMasterId r:id="rId40"/>
   </p:notesMasterIdLst>
   <p:handoutMasterIdLst>
-    <p:handoutMasterId r:id="rId37"/>
+    <p:handoutMasterId r:id="rId41"/>
   </p:handoutMasterIdLst>
   <p:sldIdLst>
     <p:sldId id="256" r:id="rId4"/>
     <p:sldId id="449" r:id="rId5"/>
-    <p:sldId id="425" r:id="rId6"/>
-    <p:sldId id="426" r:id="rId7"/>
-    <p:sldId id="432" r:id="rId8"/>
-    <p:sldId id="405" r:id="rId9"/>
-    <p:sldId id="265" r:id="rId10"/>
-    <p:sldId id="428" r:id="rId11"/>
-    <p:sldId id="427" r:id="rId12"/>
-    <p:sldId id="431" r:id="rId13"/>
-    <p:sldId id="437" r:id="rId14"/>
-    <p:sldId id="430" r:id="rId15"/>
-    <p:sldId id="433" r:id="rId16"/>
-    <p:sldId id="429" r:id="rId17"/>
-    <p:sldId id="435" r:id="rId18"/>
-    <p:sldId id="439" r:id="rId19"/>
-    <p:sldId id="438" r:id="rId20"/>
-    <p:sldId id="440" r:id="rId21"/>
-    <p:sldId id="436" r:id="rId22"/>
-    <p:sldId id="442" r:id="rId23"/>
-    <p:sldId id="443" r:id="rId24"/>
-    <p:sldId id="444" r:id="rId25"/>
-    <p:sldId id="445" r:id="rId26"/>
-    <p:sldId id="450" r:id="rId27"/>
-    <p:sldId id="441" r:id="rId28"/>
-    <p:sldId id="452" r:id="rId29"/>
-    <p:sldId id="446" r:id="rId30"/>
-    <p:sldId id="448" r:id="rId31"/>
-    <p:sldId id="447" r:id="rId32"/>
-    <p:sldId id="451" r:id="rId33"/>
-    <p:sldId id="421" r:id="rId34"/>
-    <p:sldId id="273" r:id="rId35"/>
+    <p:sldId id="455" r:id="rId6"/>
+    <p:sldId id="425" r:id="rId7"/>
+    <p:sldId id="426" r:id="rId8"/>
+    <p:sldId id="432" r:id="rId9"/>
+    <p:sldId id="405" r:id="rId10"/>
+    <p:sldId id="265" r:id="rId11"/>
+    <p:sldId id="428" r:id="rId12"/>
+    <p:sldId id="427" r:id="rId13"/>
+    <p:sldId id="431" r:id="rId14"/>
+    <p:sldId id="437" r:id="rId15"/>
+    <p:sldId id="456" r:id="rId16"/>
+    <p:sldId id="430" r:id="rId17"/>
+    <p:sldId id="433" r:id="rId18"/>
+    <p:sldId id="429" r:id="rId19"/>
+    <p:sldId id="435" r:id="rId20"/>
+    <p:sldId id="439" r:id="rId21"/>
+    <p:sldId id="438" r:id="rId22"/>
+    <p:sldId id="440" r:id="rId23"/>
+    <p:sldId id="436" r:id="rId24"/>
+    <p:sldId id="442" r:id="rId25"/>
+    <p:sldId id="443" r:id="rId26"/>
+    <p:sldId id="444" r:id="rId27"/>
+    <p:sldId id="445" r:id="rId28"/>
+    <p:sldId id="450" r:id="rId29"/>
+    <p:sldId id="441" r:id="rId30"/>
+    <p:sldId id="452" r:id="rId31"/>
+    <p:sldId id="446" r:id="rId32"/>
+    <p:sldId id="448" r:id="rId33"/>
+    <p:sldId id="453" r:id="rId34"/>
+    <p:sldId id="447" r:id="rId35"/>
+    <p:sldId id="454" r:id="rId36"/>
+    <p:sldId id="451" r:id="rId37"/>
+    <p:sldId id="421" r:id="rId38"/>
+    <p:sldId id="273" r:id="rId39"/>
   </p:sldIdLst>
   <p:sldSz cx="12192000" cy="6858000"/>
   <p:notesSz cx="6858000" cy="9144000"/>
   <p:custDataLst>
-    <p:tags r:id="rId38"/>
+    <p:tags r:id="rId42"/>
   </p:custDataLst>
   <p:defaultTextStyle>
     <a:defPPr>
@@ -150,18 +154,31 @@
     <p:ext uri="{521415D9-36F7-43E2-AB2F-B90AF26B5E84}">
       <p14:sectionLst xmlns:p14="http://schemas.microsoft.com/office/powerpoint/2010/main">
         <p14:section name="Capgemini Masters" id="{4E249A1C-D928-4AC0-A77C-65440B7A141B}">
+          <p14:sldIdLst/>
+        </p14:section>
+        <p14:section name="Introduction" id="{D9BA6872-5D9F-47C7-8EC4-D7057E897B35}">
           <p14:sldIdLst>
             <p14:sldId id="256"/>
             <p14:sldId id="449"/>
+            <p14:sldId id="455"/>
             <p14:sldId id="425"/>
             <p14:sldId id="426"/>
             <p14:sldId id="432"/>
             <p14:sldId id="405"/>
             <p14:sldId id="265"/>
             <p14:sldId id="428"/>
+          </p14:sldIdLst>
+        </p14:section>
+        <p14:section name="Architecture and setup" id="{D3B07FBD-B1B2-44B6-BBA1-23B73F69E4CC}">
+          <p14:sldIdLst>
             <p14:sldId id="427"/>
             <p14:sldId id="431"/>
             <p14:sldId id="437"/>
+          </p14:sldIdLst>
+        </p14:section>
+        <p14:section name="Python Coding" id="{13EA00EB-F96F-47DC-A201-AC9F206F254A}">
+          <p14:sldIdLst>
+            <p14:sldId id="456"/>
             <p14:sldId id="430"/>
             <p14:sldId id="433"/>
             <p14:sldId id="429"/>
@@ -171,22 +188,29 @@
             <p14:sldId id="440"/>
             <p14:sldId id="436"/>
             <p14:sldId id="442"/>
+          </p14:sldIdLst>
+        </p14:section>
+        <p14:section name="Documentation" id="{27A3334B-989C-4D03-B456-6537949B8716}">
+          <p14:sldIdLst>
             <p14:sldId id="443"/>
             <p14:sldId id="444"/>
             <p14:sldId id="445"/>
             <p14:sldId id="450"/>
+          </p14:sldIdLst>
+        </p14:section>
+        <p14:section name="Uploading a package" id="{069A89AA-9686-4E0F-BEE7-3CDE4E77EE90}">
+          <p14:sldIdLst>
             <p14:sldId id="441"/>
             <p14:sldId id="452"/>
             <p14:sldId id="446"/>
             <p14:sldId id="448"/>
+            <p14:sldId id="453"/>
             <p14:sldId id="447"/>
+            <p14:sldId id="454"/>
             <p14:sldId id="451"/>
             <p14:sldId id="421"/>
             <p14:sldId id="273"/>
           </p14:sldIdLst>
-        </p14:section>
-        <p14:section name="Graphic elements" id="{891EC914-4B3E-4CFE-A909-A820B43AB154}">
-          <p14:sldIdLst/>
         </p14:section>
       </p14:sectionLst>
     </p:ext>
@@ -889,7 +913,7 @@
     </p:spTree>
     <p:extLst>
       <p:ext uri="{BB962C8B-B14F-4D97-AF65-F5344CB8AC3E}">
-        <p14:creationId xmlns:p14="http://schemas.microsoft.com/office/powerpoint/2010/main" val="1639156819"/>
+        <p14:creationId xmlns:p14="http://schemas.microsoft.com/office/powerpoint/2010/main" val="4272886370"/>
       </p:ext>
     </p:extLst>
   </p:cSld>
@@ -977,7 +1001,7 @@
     </p:spTree>
     <p:extLst>
       <p:ext uri="{BB962C8B-B14F-4D97-AF65-F5344CB8AC3E}">
-        <p14:creationId xmlns:p14="http://schemas.microsoft.com/office/powerpoint/2010/main" val="189834346"/>
+        <p14:creationId xmlns:p14="http://schemas.microsoft.com/office/powerpoint/2010/main" val="1639156819"/>
       </p:ext>
     </p:extLst>
   </p:cSld>
@@ -1031,10 +1055,35 @@
           <a:bodyPr/>
           <a:lstStyle/>
           <a:p>
+            <a:r>
+              <a:rPr lang="en-GB" dirty="0"/>
+              <a:t>W</a:t>
+            </a:r>
+            <a:r>
+              <a:rPr lang="en-AU" dirty="0" err="1"/>
+              <a:t>e’re</a:t>
+            </a:r>
+            <a:r>
+              <a:rPr lang="en-AU" dirty="0"/>
+              <a:t> going to use </a:t>
+            </a:r>
+            <a:r>
+              <a:rPr lang="en-AU" dirty="0" err="1"/>
+              <a:t>pycharm</a:t>
+            </a:r>
+            <a:r>
+              <a:rPr lang="en-AU" dirty="0"/>
+              <a:t> for the bulk of our package coding and </a:t>
+            </a:r>
+            <a:r>
+              <a:rPr lang="en-AU" dirty="0" err="1"/>
+              <a:t>jupyter</a:t>
+            </a:r>
+            <a:r>
+              <a:rPr lang="en-AU" dirty="0"/>
+              <a:t> for testing</a:t>
+            </a:r>
             <a:endParaRPr lang="en-US" dirty="0"/>
-          </a:p>
-          <a:p>
-            <a:endParaRPr lang="en-AU" dirty="0"/>
           </a:p>
         </p:txBody>
       </p:sp>
@@ -1065,7 +1114,7 @@
     </p:spTree>
     <p:extLst>
       <p:ext uri="{BB962C8B-B14F-4D97-AF65-F5344CB8AC3E}">
-        <p14:creationId xmlns:p14="http://schemas.microsoft.com/office/powerpoint/2010/main" val="369299718"/>
+        <p14:creationId xmlns:p14="http://schemas.microsoft.com/office/powerpoint/2010/main" val="1854124791"/>
       </p:ext>
     </p:extLst>
   </p:cSld>
@@ -1153,7 +1202,7 @@
     </p:spTree>
     <p:extLst>
       <p:ext uri="{BB962C8B-B14F-4D97-AF65-F5344CB8AC3E}">
-        <p14:creationId xmlns:p14="http://schemas.microsoft.com/office/powerpoint/2010/main" val="2303523600"/>
+        <p14:creationId xmlns:p14="http://schemas.microsoft.com/office/powerpoint/2010/main" val="189834346"/>
       </p:ext>
     </p:extLst>
   </p:cSld>
@@ -1241,7 +1290,7 @@
     </p:spTree>
     <p:extLst>
       <p:ext uri="{BB962C8B-B14F-4D97-AF65-F5344CB8AC3E}">
-        <p14:creationId xmlns:p14="http://schemas.microsoft.com/office/powerpoint/2010/main" val="273739610"/>
+        <p14:creationId xmlns:p14="http://schemas.microsoft.com/office/powerpoint/2010/main" val="369299718"/>
       </p:ext>
     </p:extLst>
   </p:cSld>
@@ -1329,7 +1378,7 @@
     </p:spTree>
     <p:extLst>
       <p:ext uri="{BB962C8B-B14F-4D97-AF65-F5344CB8AC3E}">
-        <p14:creationId xmlns:p14="http://schemas.microsoft.com/office/powerpoint/2010/main" val="2826952458"/>
+        <p14:creationId xmlns:p14="http://schemas.microsoft.com/office/powerpoint/2010/main" val="2303523600"/>
       </p:ext>
     </p:extLst>
   </p:cSld>
@@ -1417,7 +1466,7 @@
     </p:spTree>
     <p:extLst>
       <p:ext uri="{BB962C8B-B14F-4D97-AF65-F5344CB8AC3E}">
-        <p14:creationId xmlns:p14="http://schemas.microsoft.com/office/powerpoint/2010/main" val="3643186912"/>
+        <p14:creationId xmlns:p14="http://schemas.microsoft.com/office/powerpoint/2010/main" val="273739610"/>
       </p:ext>
     </p:extLst>
   </p:cSld>
@@ -1505,7 +1554,7 @@
     </p:spTree>
     <p:extLst>
       <p:ext uri="{BB962C8B-B14F-4D97-AF65-F5344CB8AC3E}">
-        <p14:creationId xmlns:p14="http://schemas.microsoft.com/office/powerpoint/2010/main" val="1726262760"/>
+        <p14:creationId xmlns:p14="http://schemas.microsoft.com/office/powerpoint/2010/main" val="2826952458"/>
       </p:ext>
     </p:extLst>
   </p:cSld>
@@ -1593,7 +1642,7 @@
     </p:spTree>
     <p:extLst>
       <p:ext uri="{BB962C8B-B14F-4D97-AF65-F5344CB8AC3E}">
-        <p14:creationId xmlns:p14="http://schemas.microsoft.com/office/powerpoint/2010/main" val="216439515"/>
+        <p14:creationId xmlns:p14="http://schemas.microsoft.com/office/powerpoint/2010/main" val="3643186912"/>
       </p:ext>
     </p:extLst>
   </p:cSld>
@@ -1681,7 +1730,7 @@
     </p:spTree>
     <p:extLst>
       <p:ext uri="{BB962C8B-B14F-4D97-AF65-F5344CB8AC3E}">
-        <p14:creationId xmlns:p14="http://schemas.microsoft.com/office/powerpoint/2010/main" val="3247111287"/>
+        <p14:creationId xmlns:p14="http://schemas.microsoft.com/office/powerpoint/2010/main" val="1726262760"/>
       </p:ext>
     </p:extLst>
   </p:cSld>
@@ -1735,6 +1784,80 @@
           <a:bodyPr/>
           <a:lstStyle/>
           <a:p>
+            <a:pPr marL="0" marR="0" lvl="0" indent="0" algn="l" defTabSz="914400" rtl="0" eaLnBrk="1" fontAlgn="auto" latinLnBrk="0" hangingPunct="1">
+              <a:lnSpc>
+                <a:spcPct val="100000"/>
+              </a:lnSpc>
+              <a:spcBef>
+                <a:spcPts val="0"/>
+              </a:spcBef>
+              <a:spcAft>
+                <a:spcPts val="0"/>
+              </a:spcAft>
+              <a:buClrTx/>
+              <a:buSzTx/>
+              <a:buFontTx/>
+              <a:buNone/>
+              <a:tabLst/>
+              <a:defRPr/>
+            </a:pPr>
+            <a:r>
+              <a:rPr lang="en-GB" dirty="0"/>
+              <a:t>'I would like to begin by acknowledging the Kaurna people, Traditional Custodians of the land on which we meet today, and pay my respects to their Elders past and present. I extend that respect to Aboriginal and Torres Strait Islander peoples here today. </a:t>
+            </a:r>
+            <a:r>
+              <a:rPr lang="en-GB" b="0" i="0" dirty="0">
+                <a:solidFill>
+                  <a:srgbClr val="4D5156"/>
+                </a:solidFill>
+                <a:effectLst/>
+                <a:latin typeface="arial" panose="020B0604020202020204" pitchFamily="34" charset="0"/>
+              </a:rPr>
+              <a:t>I would also like to </a:t>
+            </a:r>
+            <a:r>
+              <a:rPr lang="en-GB" b="1" i="0" dirty="0">
+                <a:solidFill>
+                  <a:srgbClr val="5F6368"/>
+                </a:solidFill>
+                <a:effectLst/>
+                <a:latin typeface="arial" panose="020B0604020202020204" pitchFamily="34" charset="0"/>
+              </a:rPr>
+              <a:t>acknowledge</a:t>
+            </a:r>
+            <a:r>
+              <a:rPr lang="en-GB" b="0" i="0" dirty="0">
+                <a:solidFill>
+                  <a:srgbClr val="4D5156"/>
+                </a:solidFill>
+                <a:effectLst/>
+                <a:latin typeface="arial" panose="020B0604020202020204" pitchFamily="34" charset="0"/>
+              </a:rPr>
+              <a:t> that this land – which we benefit from occupying – was stolen, and that </a:t>
+            </a:r>
+            <a:r>
+              <a:rPr lang="en-GB" b="1" i="0" dirty="0">
+                <a:solidFill>
+                  <a:srgbClr val="5F6368"/>
+                </a:solidFill>
+                <a:effectLst/>
+                <a:latin typeface="arial" panose="020B0604020202020204" pitchFamily="34" charset="0"/>
+              </a:rPr>
+              <a:t>sovereignty was never ceded</a:t>
+            </a:r>
+            <a:r>
+              <a:rPr lang="en-GB" b="0" i="0" dirty="0">
+                <a:solidFill>
+                  <a:srgbClr val="4D5156"/>
+                </a:solidFill>
+                <a:effectLst/>
+                <a:latin typeface="arial" panose="020B0604020202020204" pitchFamily="34" charset="0"/>
+              </a:rPr>
+              <a:t>.</a:t>
+            </a:r>
+            <a:endParaRPr lang="en-AU" dirty="0"/>
+          </a:p>
+          <a:p>
             <a:endParaRPr lang="en-AU" dirty="0"/>
           </a:p>
         </p:txBody>
@@ -1766,7 +1889,7 @@
     </p:spTree>
     <p:extLst>
       <p:ext uri="{BB962C8B-B14F-4D97-AF65-F5344CB8AC3E}">
-        <p14:creationId xmlns:p14="http://schemas.microsoft.com/office/powerpoint/2010/main" val="2478870211"/>
+        <p14:creationId xmlns:p14="http://schemas.microsoft.com/office/powerpoint/2010/main" val="1465193686"/>
       </p:ext>
     </p:extLst>
   </p:cSld>
@@ -1854,7 +1977,7 @@
     </p:spTree>
     <p:extLst>
       <p:ext uri="{BB962C8B-B14F-4D97-AF65-F5344CB8AC3E}">
-        <p14:creationId xmlns:p14="http://schemas.microsoft.com/office/powerpoint/2010/main" val="3092755618"/>
+        <p14:creationId xmlns:p14="http://schemas.microsoft.com/office/powerpoint/2010/main" val="216439515"/>
       </p:ext>
     </p:extLst>
   </p:cSld>
@@ -1942,7 +2065,7 @@
     </p:spTree>
     <p:extLst>
       <p:ext uri="{BB962C8B-B14F-4D97-AF65-F5344CB8AC3E}">
-        <p14:creationId xmlns:p14="http://schemas.microsoft.com/office/powerpoint/2010/main" val="882275526"/>
+        <p14:creationId xmlns:p14="http://schemas.microsoft.com/office/powerpoint/2010/main" val="3247111287"/>
       </p:ext>
     </p:extLst>
   </p:cSld>
@@ -2030,7 +2153,7 @@
     </p:spTree>
     <p:extLst>
       <p:ext uri="{BB962C8B-B14F-4D97-AF65-F5344CB8AC3E}">
-        <p14:creationId xmlns:p14="http://schemas.microsoft.com/office/powerpoint/2010/main" val="240317753"/>
+        <p14:creationId xmlns:p14="http://schemas.microsoft.com/office/powerpoint/2010/main" val="3092755618"/>
       </p:ext>
     </p:extLst>
   </p:cSld>
@@ -2118,7 +2241,7 @@
     </p:spTree>
     <p:extLst>
       <p:ext uri="{BB962C8B-B14F-4D97-AF65-F5344CB8AC3E}">
-        <p14:creationId xmlns:p14="http://schemas.microsoft.com/office/powerpoint/2010/main" val="3061317103"/>
+        <p14:creationId xmlns:p14="http://schemas.microsoft.com/office/powerpoint/2010/main" val="882275526"/>
       </p:ext>
     </p:extLst>
   </p:cSld>
@@ -2206,7 +2329,7 @@
     </p:spTree>
     <p:extLst>
       <p:ext uri="{BB962C8B-B14F-4D97-AF65-F5344CB8AC3E}">
-        <p14:creationId xmlns:p14="http://schemas.microsoft.com/office/powerpoint/2010/main" val="619177181"/>
+        <p14:creationId xmlns:p14="http://schemas.microsoft.com/office/powerpoint/2010/main" val="240317753"/>
       </p:ext>
     </p:extLst>
   </p:cSld>
@@ -2294,7 +2417,7 @@
     </p:spTree>
     <p:extLst>
       <p:ext uri="{BB962C8B-B14F-4D97-AF65-F5344CB8AC3E}">
-        <p14:creationId xmlns:p14="http://schemas.microsoft.com/office/powerpoint/2010/main" val="3413599763"/>
+        <p14:creationId xmlns:p14="http://schemas.microsoft.com/office/powerpoint/2010/main" val="3061317103"/>
       </p:ext>
     </p:extLst>
   </p:cSld>
@@ -2382,7 +2505,7 @@
     </p:spTree>
     <p:extLst>
       <p:ext uri="{BB962C8B-B14F-4D97-AF65-F5344CB8AC3E}">
-        <p14:creationId xmlns:p14="http://schemas.microsoft.com/office/powerpoint/2010/main" val="3972754187"/>
+        <p14:creationId xmlns:p14="http://schemas.microsoft.com/office/powerpoint/2010/main" val="619177181"/>
       </p:ext>
     </p:extLst>
   </p:cSld>
@@ -2470,7 +2593,7 @@
     </p:spTree>
     <p:extLst>
       <p:ext uri="{BB962C8B-B14F-4D97-AF65-F5344CB8AC3E}">
-        <p14:creationId xmlns:p14="http://schemas.microsoft.com/office/powerpoint/2010/main" val="1207555532"/>
+        <p14:creationId xmlns:p14="http://schemas.microsoft.com/office/powerpoint/2010/main" val="3413599763"/>
       </p:ext>
     </p:extLst>
   </p:cSld>
@@ -2558,7 +2681,7 @@
     </p:spTree>
     <p:extLst>
       <p:ext uri="{BB962C8B-B14F-4D97-AF65-F5344CB8AC3E}">
-        <p14:creationId xmlns:p14="http://schemas.microsoft.com/office/powerpoint/2010/main" val="4094035875"/>
+        <p14:creationId xmlns:p14="http://schemas.microsoft.com/office/powerpoint/2010/main" val="3972754187"/>
       </p:ext>
     </p:extLst>
   </p:cSld>
@@ -2646,7 +2769,7 @@
     </p:spTree>
     <p:extLst>
       <p:ext uri="{BB962C8B-B14F-4D97-AF65-F5344CB8AC3E}">
-        <p14:creationId xmlns:p14="http://schemas.microsoft.com/office/powerpoint/2010/main" val="3169274995"/>
+        <p14:creationId xmlns:p14="http://schemas.microsoft.com/office/powerpoint/2010/main" val="1207555532"/>
       </p:ext>
     </p:extLst>
   </p:cSld>
@@ -2731,7 +2854,429 @@
     </p:spTree>
     <p:extLst>
       <p:ext uri="{BB962C8B-B14F-4D97-AF65-F5344CB8AC3E}">
-        <p14:creationId xmlns:p14="http://schemas.microsoft.com/office/powerpoint/2010/main" val="901425631"/>
+        <p14:creationId xmlns:p14="http://schemas.microsoft.com/office/powerpoint/2010/main" val="2478870211"/>
+      </p:ext>
+    </p:extLst>
+  </p:cSld>
+  <p:clrMapOvr>
+    <a:masterClrMapping/>
+  </p:clrMapOvr>
+</p:notes>
+</file>
+
+<file path=ppt/notesSlides/notesSlide30.xml><?xml version="1.0" encoding="utf-8"?>
+<p:notes xmlns:a="http://schemas.openxmlformats.org/drawingml/2006/main" xmlns:r="http://schemas.openxmlformats.org/officeDocument/2006/relationships" xmlns:p="http://schemas.openxmlformats.org/presentationml/2006/main">
+  <p:cSld>
+    <p:spTree>
+      <p:nvGrpSpPr>
+        <p:cNvPr id="1" name=""/>
+        <p:cNvGrpSpPr/>
+        <p:nvPr/>
+      </p:nvGrpSpPr>
+      <p:grpSpPr>
+        <a:xfrm>
+          <a:off x="0" y="0"/>
+          <a:ext cx="0" cy="0"/>
+          <a:chOff x="0" y="0"/>
+          <a:chExt cx="0" cy="0"/>
+        </a:xfrm>
+      </p:grpSpPr>
+      <p:sp>
+        <p:nvSpPr>
+          <p:cNvPr id="2" name="Slide Image Placeholder 1"/>
+          <p:cNvSpPr>
+            <a:spLocks noGrp="1" noRot="1" noChangeAspect="1"/>
+          </p:cNvSpPr>
+          <p:nvPr>
+            <p:ph type="sldImg"/>
+          </p:nvPr>
+        </p:nvSpPr>
+        <p:spPr/>
+      </p:sp>
+      <p:sp>
+        <p:nvSpPr>
+          <p:cNvPr id="3" name="Notes Placeholder 2"/>
+          <p:cNvSpPr>
+            <a:spLocks noGrp="1"/>
+          </p:cNvSpPr>
+          <p:nvPr>
+            <p:ph type="body" idx="1"/>
+          </p:nvPr>
+        </p:nvSpPr>
+        <p:spPr/>
+        <p:txBody>
+          <a:bodyPr/>
+          <a:lstStyle/>
+          <a:p>
+            <a:endParaRPr lang="en-US" dirty="0"/>
+          </a:p>
+          <a:p>
+            <a:endParaRPr lang="en-AU" dirty="0"/>
+          </a:p>
+        </p:txBody>
+      </p:sp>
+      <p:sp>
+        <p:nvSpPr>
+          <p:cNvPr id="4" name="Slide Number Placeholder 3"/>
+          <p:cNvSpPr>
+            <a:spLocks noGrp="1"/>
+          </p:cNvSpPr>
+          <p:nvPr>
+            <p:ph type="sldNum" sz="quarter" idx="5"/>
+          </p:nvPr>
+        </p:nvSpPr>
+        <p:spPr/>
+        <p:txBody>
+          <a:bodyPr/>
+          <a:lstStyle/>
+          <a:p>
+            <a:fld id="{C0696B5C-12A0-4042-B4D0-BD3B9A4F58C6}" type="slidenum">
+              <a:rPr lang="pt-BR" smtClean="0"/>
+              <a:pPr/>
+              <a:t>31</a:t>
+            </a:fld>
+            <a:endParaRPr lang="pt-BR"/>
+          </a:p>
+        </p:txBody>
+      </p:sp>
+    </p:spTree>
+    <p:extLst>
+      <p:ext uri="{BB962C8B-B14F-4D97-AF65-F5344CB8AC3E}">
+        <p14:creationId xmlns:p14="http://schemas.microsoft.com/office/powerpoint/2010/main" val="309972131"/>
+      </p:ext>
+    </p:extLst>
+  </p:cSld>
+  <p:clrMapOvr>
+    <a:masterClrMapping/>
+  </p:clrMapOvr>
+</p:notes>
+</file>
+
+<file path=ppt/notesSlides/notesSlide31.xml><?xml version="1.0" encoding="utf-8"?>
+<p:notes xmlns:a="http://schemas.openxmlformats.org/drawingml/2006/main" xmlns:r="http://schemas.openxmlformats.org/officeDocument/2006/relationships" xmlns:p="http://schemas.openxmlformats.org/presentationml/2006/main">
+  <p:cSld>
+    <p:spTree>
+      <p:nvGrpSpPr>
+        <p:cNvPr id="1" name=""/>
+        <p:cNvGrpSpPr/>
+        <p:nvPr/>
+      </p:nvGrpSpPr>
+      <p:grpSpPr>
+        <a:xfrm>
+          <a:off x="0" y="0"/>
+          <a:ext cx="0" cy="0"/>
+          <a:chOff x="0" y="0"/>
+          <a:chExt cx="0" cy="0"/>
+        </a:xfrm>
+      </p:grpSpPr>
+      <p:sp>
+        <p:nvSpPr>
+          <p:cNvPr id="2" name="Slide Image Placeholder 1"/>
+          <p:cNvSpPr>
+            <a:spLocks noGrp="1" noRot="1" noChangeAspect="1"/>
+          </p:cNvSpPr>
+          <p:nvPr>
+            <p:ph type="sldImg"/>
+          </p:nvPr>
+        </p:nvSpPr>
+        <p:spPr/>
+      </p:sp>
+      <p:sp>
+        <p:nvSpPr>
+          <p:cNvPr id="3" name="Notes Placeholder 2"/>
+          <p:cNvSpPr>
+            <a:spLocks noGrp="1"/>
+          </p:cNvSpPr>
+          <p:nvPr>
+            <p:ph type="body" idx="1"/>
+          </p:nvPr>
+        </p:nvSpPr>
+        <p:spPr/>
+        <p:txBody>
+          <a:bodyPr/>
+          <a:lstStyle/>
+          <a:p>
+            <a:pPr marL="0" marR="0" lvl="0" indent="0" algn="l" defTabSz="914400" rtl="0" eaLnBrk="1" fontAlgn="auto" latinLnBrk="0" hangingPunct="1">
+              <a:lnSpc>
+                <a:spcPct val="100000"/>
+              </a:lnSpc>
+              <a:spcBef>
+                <a:spcPts val="0"/>
+              </a:spcBef>
+              <a:spcAft>
+                <a:spcPts val="0"/>
+              </a:spcAft>
+              <a:buClrTx/>
+              <a:buSzTx/>
+              <a:buFontTx/>
+              <a:buNone/>
+              <a:tabLst/>
+              <a:defRPr/>
+            </a:pPr>
+            <a:r>
+              <a:rPr lang="en-AU" sz="700" dirty="0"/>
+              <a:t>I myself have bashed my head against a wall for hours trying to get this to work and correctly upload.</a:t>
+            </a:r>
+          </a:p>
+          <a:p>
+            <a:pPr marL="0" marR="0" lvl="0" indent="0" algn="l" defTabSz="914400" rtl="0" eaLnBrk="1" fontAlgn="auto" latinLnBrk="0" hangingPunct="1">
+              <a:lnSpc>
+                <a:spcPct val="100000"/>
+              </a:lnSpc>
+              <a:spcBef>
+                <a:spcPts val="0"/>
+              </a:spcBef>
+              <a:spcAft>
+                <a:spcPts val="0"/>
+              </a:spcAft>
+              <a:buClrTx/>
+              <a:buSzTx/>
+              <a:buFontTx/>
+              <a:buNone/>
+              <a:tabLst/>
+              <a:defRPr/>
+            </a:pPr>
+            <a:r>
+              <a:rPr lang="en-AU" sz="700" dirty="0"/>
+              <a:t>Now that I’ve done it a couple of times, it took me about 5 minutes to get this to work with one error when testing before this talk.</a:t>
+            </a:r>
+          </a:p>
+          <a:p>
+            <a:endParaRPr lang="en-AU" dirty="0"/>
+          </a:p>
+        </p:txBody>
+      </p:sp>
+      <p:sp>
+        <p:nvSpPr>
+          <p:cNvPr id="4" name="Slide Number Placeholder 3"/>
+          <p:cNvSpPr>
+            <a:spLocks noGrp="1"/>
+          </p:cNvSpPr>
+          <p:nvPr>
+            <p:ph type="sldNum" sz="quarter" idx="5"/>
+          </p:nvPr>
+        </p:nvSpPr>
+        <p:spPr/>
+        <p:txBody>
+          <a:bodyPr/>
+          <a:lstStyle/>
+          <a:p>
+            <a:fld id="{C0696B5C-12A0-4042-B4D0-BD3B9A4F58C6}" type="slidenum">
+              <a:rPr lang="pt-BR" smtClean="0"/>
+              <a:pPr/>
+              <a:t>32</a:t>
+            </a:fld>
+            <a:endParaRPr lang="pt-BR"/>
+          </a:p>
+        </p:txBody>
+      </p:sp>
+    </p:spTree>
+    <p:extLst>
+      <p:ext uri="{BB962C8B-B14F-4D97-AF65-F5344CB8AC3E}">
+        <p14:creationId xmlns:p14="http://schemas.microsoft.com/office/powerpoint/2010/main" val="4094035875"/>
+      </p:ext>
+    </p:extLst>
+  </p:cSld>
+  <p:clrMapOvr>
+    <a:masterClrMapping/>
+  </p:clrMapOvr>
+</p:notes>
+</file>
+
+<file path=ppt/notesSlides/notesSlide32.xml><?xml version="1.0" encoding="utf-8"?>
+<p:notes xmlns:a="http://schemas.openxmlformats.org/drawingml/2006/main" xmlns:r="http://schemas.openxmlformats.org/officeDocument/2006/relationships" xmlns:p="http://schemas.openxmlformats.org/presentationml/2006/main">
+  <p:cSld>
+    <p:spTree>
+      <p:nvGrpSpPr>
+        <p:cNvPr id="1" name=""/>
+        <p:cNvGrpSpPr/>
+        <p:nvPr/>
+      </p:nvGrpSpPr>
+      <p:grpSpPr>
+        <a:xfrm>
+          <a:off x="0" y="0"/>
+          <a:ext cx="0" cy="0"/>
+          <a:chOff x="0" y="0"/>
+          <a:chExt cx="0" cy="0"/>
+        </a:xfrm>
+      </p:grpSpPr>
+      <p:sp>
+        <p:nvSpPr>
+          <p:cNvPr id="2" name="Slide Image Placeholder 1"/>
+          <p:cNvSpPr>
+            <a:spLocks noGrp="1" noRot="1" noChangeAspect="1"/>
+          </p:cNvSpPr>
+          <p:nvPr>
+            <p:ph type="sldImg"/>
+          </p:nvPr>
+        </p:nvSpPr>
+        <p:spPr/>
+      </p:sp>
+      <p:sp>
+        <p:nvSpPr>
+          <p:cNvPr id="3" name="Notes Placeholder 2"/>
+          <p:cNvSpPr>
+            <a:spLocks noGrp="1"/>
+          </p:cNvSpPr>
+          <p:nvPr>
+            <p:ph type="body" idx="1"/>
+          </p:nvPr>
+        </p:nvSpPr>
+        <p:spPr/>
+        <p:txBody>
+          <a:bodyPr/>
+          <a:lstStyle/>
+          <a:p>
+            <a:endParaRPr lang="en-US" dirty="0"/>
+          </a:p>
+          <a:p>
+            <a:endParaRPr lang="en-AU" dirty="0"/>
+          </a:p>
+        </p:txBody>
+      </p:sp>
+      <p:sp>
+        <p:nvSpPr>
+          <p:cNvPr id="4" name="Slide Number Placeholder 3"/>
+          <p:cNvSpPr>
+            <a:spLocks noGrp="1"/>
+          </p:cNvSpPr>
+          <p:nvPr>
+            <p:ph type="sldNum" sz="quarter" idx="5"/>
+          </p:nvPr>
+        </p:nvSpPr>
+        <p:spPr/>
+        <p:txBody>
+          <a:bodyPr/>
+          <a:lstStyle/>
+          <a:p>
+            <a:fld id="{C0696B5C-12A0-4042-B4D0-BD3B9A4F58C6}" type="slidenum">
+              <a:rPr lang="pt-BR" smtClean="0"/>
+              <a:pPr/>
+              <a:t>33</a:t>
+            </a:fld>
+            <a:endParaRPr lang="pt-BR"/>
+          </a:p>
+        </p:txBody>
+      </p:sp>
+    </p:spTree>
+    <p:extLst>
+      <p:ext uri="{BB962C8B-B14F-4D97-AF65-F5344CB8AC3E}">
+        <p14:creationId xmlns:p14="http://schemas.microsoft.com/office/powerpoint/2010/main" val="3141744071"/>
+      </p:ext>
+    </p:extLst>
+  </p:cSld>
+  <p:clrMapOvr>
+    <a:masterClrMapping/>
+  </p:clrMapOvr>
+</p:notes>
+</file>
+
+<file path=ppt/notesSlides/notesSlide33.xml><?xml version="1.0" encoding="utf-8"?>
+<p:notes xmlns:a="http://schemas.openxmlformats.org/drawingml/2006/main" xmlns:r="http://schemas.openxmlformats.org/officeDocument/2006/relationships" xmlns:p="http://schemas.openxmlformats.org/presentationml/2006/main">
+  <p:cSld>
+    <p:spTree>
+      <p:nvGrpSpPr>
+        <p:cNvPr id="1" name=""/>
+        <p:cNvGrpSpPr/>
+        <p:nvPr/>
+      </p:nvGrpSpPr>
+      <p:grpSpPr>
+        <a:xfrm>
+          <a:off x="0" y="0"/>
+          <a:ext cx="0" cy="0"/>
+          <a:chOff x="0" y="0"/>
+          <a:chExt cx="0" cy="0"/>
+        </a:xfrm>
+      </p:grpSpPr>
+      <p:sp>
+        <p:nvSpPr>
+          <p:cNvPr id="2" name="Slide Image Placeholder 1"/>
+          <p:cNvSpPr>
+            <a:spLocks noGrp="1" noRot="1" noChangeAspect="1"/>
+          </p:cNvSpPr>
+          <p:nvPr>
+            <p:ph type="sldImg"/>
+          </p:nvPr>
+        </p:nvSpPr>
+        <p:spPr/>
+      </p:sp>
+      <p:sp>
+        <p:nvSpPr>
+          <p:cNvPr id="3" name="Notes Placeholder 2"/>
+          <p:cNvSpPr>
+            <a:spLocks noGrp="1"/>
+          </p:cNvSpPr>
+          <p:nvPr>
+            <p:ph type="body" idx="1"/>
+          </p:nvPr>
+        </p:nvSpPr>
+        <p:spPr/>
+        <p:txBody>
+          <a:bodyPr/>
+          <a:lstStyle/>
+          <a:p>
+            <a:r>
+              <a:rPr lang="en-GB" b="0" i="0" dirty="0">
+                <a:solidFill>
+                  <a:srgbClr val="FFFFFF"/>
+                </a:solidFill>
+                <a:effectLst/>
+                <a:latin typeface="Source Code Pro"/>
+              </a:rPr>
+              <a:t>pip install -i https://test.pypi.org/simple/ python-</a:t>
+            </a:r>
+            <a:r>
+              <a:rPr lang="en-GB" b="0" i="0" dirty="0" err="1">
+                <a:solidFill>
+                  <a:srgbClr val="FFFFFF"/>
+                </a:solidFill>
+                <a:effectLst/>
+                <a:latin typeface="Source Code Pro"/>
+              </a:rPr>
+              <a:t>playingcards</a:t>
+            </a:r>
+            <a:r>
+              <a:rPr lang="en-GB" b="0" i="0" dirty="0">
+                <a:solidFill>
+                  <a:srgbClr val="FFFFFF"/>
+                </a:solidFill>
+                <a:effectLst/>
+                <a:latin typeface="Source Code Pro"/>
+              </a:rPr>
+              <a:t>-dev</a:t>
+            </a:r>
+            <a:endParaRPr lang="en-AU" dirty="0"/>
+          </a:p>
+        </p:txBody>
+      </p:sp>
+      <p:sp>
+        <p:nvSpPr>
+          <p:cNvPr id="4" name="Slide Number Placeholder 3"/>
+          <p:cNvSpPr>
+            <a:spLocks noGrp="1"/>
+          </p:cNvSpPr>
+          <p:nvPr>
+            <p:ph type="sldNum" sz="quarter" idx="5"/>
+          </p:nvPr>
+        </p:nvSpPr>
+        <p:spPr/>
+        <p:txBody>
+          <a:bodyPr/>
+          <a:lstStyle/>
+          <a:p>
+            <a:fld id="{C0696B5C-12A0-4042-B4D0-BD3B9A4F58C6}" type="slidenum">
+              <a:rPr lang="pt-BR" smtClean="0"/>
+              <a:pPr/>
+              <a:t>34</a:t>
+            </a:fld>
+            <a:endParaRPr lang="pt-BR"/>
+          </a:p>
+        </p:txBody>
+      </p:sp>
+    </p:spTree>
+    <p:extLst>
+      <p:ext uri="{BB962C8B-B14F-4D97-AF65-F5344CB8AC3E}">
+        <p14:creationId xmlns:p14="http://schemas.microsoft.com/office/powerpoint/2010/main" val="3169274995"/>
       </p:ext>
     </p:extLst>
   </p:cSld>
@@ -2816,7 +3361,7 @@
     </p:spTree>
     <p:extLst>
       <p:ext uri="{BB962C8B-B14F-4D97-AF65-F5344CB8AC3E}">
-        <p14:creationId xmlns:p14="http://schemas.microsoft.com/office/powerpoint/2010/main" val="940637062"/>
+        <p14:creationId xmlns:p14="http://schemas.microsoft.com/office/powerpoint/2010/main" val="901425631"/>
       </p:ext>
     </p:extLst>
   </p:cSld>
@@ -2901,7 +3446,7 @@
     </p:spTree>
     <p:extLst>
       <p:ext uri="{BB962C8B-B14F-4D97-AF65-F5344CB8AC3E}">
-        <p14:creationId xmlns:p14="http://schemas.microsoft.com/office/powerpoint/2010/main" val="2854550361"/>
+        <p14:creationId xmlns:p14="http://schemas.microsoft.com/office/powerpoint/2010/main" val="940637062"/>
       </p:ext>
     </p:extLst>
   </p:cSld>
@@ -2955,9 +3500,6 @@
           <a:bodyPr/>
           <a:lstStyle/>
           <a:p>
-            <a:endParaRPr lang="en-US" dirty="0"/>
-          </a:p>
-          <a:p>
             <a:endParaRPr lang="en-AU" dirty="0"/>
           </a:p>
         </p:txBody>
@@ -2989,7 +3531,7 @@
     </p:spTree>
     <p:extLst>
       <p:ext uri="{BB962C8B-B14F-4D97-AF65-F5344CB8AC3E}">
-        <p14:creationId xmlns:p14="http://schemas.microsoft.com/office/powerpoint/2010/main" val="2673644124"/>
+        <p14:creationId xmlns:p14="http://schemas.microsoft.com/office/powerpoint/2010/main" val="2854550361"/>
       </p:ext>
     </p:extLst>
   </p:cSld>
@@ -3077,7 +3619,7 @@
     </p:spTree>
     <p:extLst>
       <p:ext uri="{BB962C8B-B14F-4D97-AF65-F5344CB8AC3E}">
-        <p14:creationId xmlns:p14="http://schemas.microsoft.com/office/powerpoint/2010/main" val="2453698082"/>
+        <p14:creationId xmlns:p14="http://schemas.microsoft.com/office/powerpoint/2010/main" val="2673644124"/>
       </p:ext>
     </p:extLst>
   </p:cSld>
@@ -3165,7 +3707,7 @@
     </p:spTree>
     <p:extLst>
       <p:ext uri="{BB962C8B-B14F-4D97-AF65-F5344CB8AC3E}">
-        <p14:creationId xmlns:p14="http://schemas.microsoft.com/office/powerpoint/2010/main" val="46565421"/>
+        <p14:creationId xmlns:p14="http://schemas.microsoft.com/office/powerpoint/2010/main" val="2453698082"/>
       </p:ext>
     </p:extLst>
   </p:cSld>
@@ -3253,7 +3795,7 @@
     </p:spTree>
     <p:extLst>
       <p:ext uri="{BB962C8B-B14F-4D97-AF65-F5344CB8AC3E}">
-        <p14:creationId xmlns:p14="http://schemas.microsoft.com/office/powerpoint/2010/main" val="4272886370"/>
+        <p14:creationId xmlns:p14="http://schemas.microsoft.com/office/powerpoint/2010/main" val="46565421"/>
       </p:ext>
     </p:extLst>
   </p:cSld>
@@ -3404,7 +3946,7 @@
           <a:graphicData uri="http://schemas.openxmlformats.org/presentationml/2006/ole">
             <mc:AlternateContent xmlns:mc="http://schemas.openxmlformats.org/markup-compatibility/2006">
               <mc:Choice xmlns:v="urn:schemas-microsoft-com:vml" Requires="v">
-                <p:oleObj spid="_x0000_s28793" name="think-cell Slide" r:id="rId4" imgW="270" imgH="270" progId="TCLayout.ActiveDocument.1">
+                <p:oleObj spid="_x0000_s28799" name="think-cell Slide" r:id="rId4" imgW="270" imgH="270" progId="TCLayout.ActiveDocument.1">
                   <p:embed/>
                 </p:oleObj>
               </mc:Choice>
@@ -5302,7 +5844,7 @@
           <a:graphicData uri="http://schemas.openxmlformats.org/presentationml/2006/ole">
             <mc:AlternateContent xmlns:mc="http://schemas.openxmlformats.org/markup-compatibility/2006">
               <mc:Choice xmlns:v="urn:schemas-microsoft-com:vml" Requires="v">
-                <p:oleObj spid="_x0000_s26743" name="think-cell Slide" r:id="rId4" imgW="270" imgH="270" progId="TCLayout.ActiveDocument.1">
+                <p:oleObj spid="_x0000_s26749" name="think-cell Slide" r:id="rId4" imgW="270" imgH="270" progId="TCLayout.ActiveDocument.1">
                   <p:embed/>
                 </p:oleObj>
               </mc:Choice>
@@ -7571,7 +8113,7 @@
           <a:graphicData uri="http://schemas.openxmlformats.org/presentationml/2006/ole">
             <mc:AlternateContent xmlns:mc="http://schemas.openxmlformats.org/markup-compatibility/2006">
               <mc:Choice xmlns:v="urn:schemas-microsoft-com:vml" Requires="v">
-                <p:oleObj spid="_x0000_s66645" name="think-cell Slide" r:id="rId4" imgW="270" imgH="270" progId="TCLayout.ActiveDocument.1">
+                <p:oleObj spid="_x0000_s66651" name="think-cell Slide" r:id="rId4" imgW="270" imgH="270" progId="TCLayout.ActiveDocument.1">
                   <p:embed/>
                 </p:oleObj>
               </mc:Choice>
@@ -9244,7 +9786,7 @@
           <a:graphicData uri="http://schemas.openxmlformats.org/presentationml/2006/ole">
             <mc:AlternateContent xmlns:mc="http://schemas.openxmlformats.org/markup-compatibility/2006">
               <mc:Choice xmlns:v="urn:schemas-microsoft-com:vml" Requires="v">
-                <p:oleObj spid="_x0000_s67670" name="think-cell Slide" r:id="rId4" imgW="270" imgH="270" progId="TCLayout.ActiveDocument.1">
+                <p:oleObj spid="_x0000_s67676" name="think-cell Slide" r:id="rId4" imgW="270" imgH="270" progId="TCLayout.ActiveDocument.1">
                   <p:embed/>
                 </p:oleObj>
               </mc:Choice>
@@ -21409,7 +21951,7 @@
           <a:graphicData uri="http://schemas.openxmlformats.org/presentationml/2006/ole">
             <mc:AlternateContent xmlns:mc="http://schemas.openxmlformats.org/markup-compatibility/2006">
               <mc:Choice xmlns:v="urn:schemas-microsoft-com:vml" Requires="v">
-                <p:oleObj spid="_x0000_s21626" name="think-cell Slide" r:id="rId4" imgW="270" imgH="270" progId="TCLayout.ActiveDocument.1">
+                <p:oleObj spid="_x0000_s21632" name="think-cell Slide" r:id="rId4" imgW="270" imgH="270" progId="TCLayout.ActiveDocument.1">
                   <p:embed/>
                 </p:oleObj>
               </mc:Choice>
@@ -22176,7 +22718,7 @@
           <a:graphicData uri="http://schemas.openxmlformats.org/presentationml/2006/ole">
             <mc:AlternateContent xmlns:mc="http://schemas.openxmlformats.org/markup-compatibility/2006">
               <mc:Choice xmlns:v="urn:schemas-microsoft-com:vml" Requires="v">
-                <p:oleObj spid="_x0000_s9334" name="think-cell Slide" r:id="rId4" imgW="270" imgH="270" progId="TCLayout.ActiveDocument.1">
+                <p:oleObj spid="_x0000_s9340" name="think-cell Slide" r:id="rId4" imgW="270" imgH="270" progId="TCLayout.ActiveDocument.1">
                   <p:embed/>
                 </p:oleObj>
               </mc:Choice>
@@ -22298,7 +22840,7 @@
           <a:graphicData uri="http://schemas.openxmlformats.org/presentationml/2006/ole">
             <mc:AlternateContent xmlns:mc="http://schemas.openxmlformats.org/markup-compatibility/2006">
               <mc:Choice xmlns:v="urn:schemas-microsoft-com:vml" Requires="v">
-                <p:oleObj spid="_x0000_s64615" name="think-cell Slide" r:id="rId4" imgW="270" imgH="270" progId="TCLayout.ActiveDocument.1">
+                <p:oleObj spid="_x0000_s64621" name="think-cell Slide" r:id="rId4" imgW="270" imgH="270" progId="TCLayout.ActiveDocument.1">
                   <p:embed/>
                 </p:oleObj>
               </mc:Choice>
@@ -22410,7 +22952,7 @@
           <a:graphicData uri="http://schemas.openxmlformats.org/presentationml/2006/ole">
             <mc:AlternateContent xmlns:mc="http://schemas.openxmlformats.org/markup-compatibility/2006">
               <mc:Choice xmlns:v="urn:schemas-microsoft-com:vml" Requires="v">
-                <p:oleObj spid="_x0000_s25719" name="think-cell Slide" r:id="rId4" imgW="270" imgH="270" progId="TCLayout.ActiveDocument.1">
+                <p:oleObj spid="_x0000_s25725" name="think-cell Slide" r:id="rId4" imgW="270" imgH="270" progId="TCLayout.ActiveDocument.1">
                   <p:embed/>
                 </p:oleObj>
               </mc:Choice>
@@ -24403,7 +24945,7 @@
           <a:graphicData uri="http://schemas.openxmlformats.org/presentationml/2006/ole">
             <mc:AlternateContent xmlns:mc="http://schemas.openxmlformats.org/markup-compatibility/2006">
               <mc:Choice xmlns:v="urn:schemas-microsoft-com:vml" Requires="v">
-                <p:oleObj spid="_x0000_s4222" name="think-cell Slide" r:id="rId12" imgW="270" imgH="270" progId="TCLayout.ActiveDocument.1">
+                <p:oleObj spid="_x0000_s4228" name="think-cell Slide" r:id="rId12" imgW="270" imgH="270" progId="TCLayout.ActiveDocument.1">
                   <p:embed/>
                 </p:oleObj>
               </mc:Choice>
@@ -26841,7 +27383,7 @@
           <a:graphicData uri="http://schemas.openxmlformats.org/presentationml/2006/ole">
             <mc:AlternateContent xmlns:mc="http://schemas.openxmlformats.org/markup-compatibility/2006">
               <mc:Choice xmlns:v="urn:schemas-microsoft-com:vml" Requires="v">
-                <p:oleObj spid="_x0000_s24699" name="think-cell Slide" r:id="rId9" imgW="270" imgH="270" progId="TCLayout.ActiveDocument.1">
+                <p:oleObj spid="_x0000_s24705" name="think-cell Slide" r:id="rId9" imgW="270" imgH="270" progId="TCLayout.ActiveDocument.1">
                   <p:embed/>
                 </p:oleObj>
               </mc:Choice>
@@ -27575,7 +28117,7 @@
           <a:graphicData uri="http://schemas.openxmlformats.org/presentationml/2006/ole">
             <mc:AlternateContent xmlns:mc="http://schemas.openxmlformats.org/markup-compatibility/2006">
               <mc:Choice xmlns:v="urn:schemas-microsoft-com:vml" Requires="v">
-                <p:oleObj spid="_x0000_s29815" name="think-cell Slide" r:id="rId6" imgW="270" imgH="270" progId="TCLayout.ActiveDocument.1">
+                <p:oleObj spid="_x0000_s29821" name="think-cell Slide" r:id="rId6" imgW="270" imgH="270" progId="TCLayout.ActiveDocument.1">
                   <p:embed/>
                 </p:oleObj>
               </mc:Choice>
@@ -28082,6 +28624,371 @@
             </a:br>
             <a:r>
               <a:rPr lang="en-US" dirty="0"/>
+              <a:t>First things first</a:t>
+            </a:r>
+            <a:endParaRPr lang="en-GB" dirty="0"/>
+          </a:p>
+        </p:txBody>
+      </p:sp>
+      <p:sp>
+        <p:nvSpPr>
+          <p:cNvPr id="6" name="Text Placeholder 5"/>
+          <p:cNvSpPr>
+            <a:spLocks noGrp="1"/>
+          </p:cNvSpPr>
+          <p:nvPr>
+            <p:ph type="body" sz="quarter" idx="11"/>
+          </p:nvPr>
+        </p:nvSpPr>
+        <p:spPr/>
+        <p:txBody>
+          <a:bodyPr/>
+          <a:lstStyle/>
+          <a:p>
+            <a:r>
+              <a:rPr lang="en-GB" dirty="0"/>
+              <a:t>Set up our project</a:t>
+            </a:r>
+          </a:p>
+        </p:txBody>
+      </p:sp>
+      <p:pic>
+        <p:nvPicPr>
+          <p:cNvPr id="3" name="Picture 2" descr="Icon&#10;&#10;Description automatically generated">
+            <a:extLst>
+              <a:ext uri="{FF2B5EF4-FFF2-40B4-BE49-F238E27FC236}">
+                <a16:creationId xmlns:a16="http://schemas.microsoft.com/office/drawing/2014/main" id="{84E7A233-F750-4377-93D6-75D3CED4AC30}"/>
+              </a:ext>
+            </a:extLst>
+          </p:cNvPr>
+          <p:cNvPicPr>
+            <a:picLocks noChangeAspect="1"/>
+          </p:cNvPicPr>
+          <p:nvPr/>
+        </p:nvPicPr>
+        <p:blipFill>
+          <a:blip r:embed="rId3">
+            <a:extLst>
+              <a:ext uri="{28A0092B-C50C-407E-A947-70E740481C1C}">
+                <a14:useLocalDpi xmlns:a14="http://schemas.microsoft.com/office/drawing/2010/main" val="0"/>
+              </a:ext>
+            </a:extLst>
+          </a:blip>
+          <a:stretch>
+            <a:fillRect/>
+          </a:stretch>
+        </p:blipFill>
+        <p:spPr>
+          <a:xfrm>
+            <a:off x="912000" y="1845000"/>
+            <a:ext cx="1296000" cy="1296000"/>
+          </a:xfrm>
+          <a:prstGeom prst="rect">
+            <a:avLst/>
+          </a:prstGeom>
+        </p:spPr>
+      </p:pic>
+      <p:sp>
+        <p:nvSpPr>
+          <p:cNvPr id="7" name="TextBox 6">
+            <a:extLst>
+              <a:ext uri="{FF2B5EF4-FFF2-40B4-BE49-F238E27FC236}">
+                <a16:creationId xmlns:a16="http://schemas.microsoft.com/office/drawing/2014/main" id="{98173C9A-BC3F-4AAF-B1DF-EBCB8FEB9D9F}"/>
+              </a:ext>
+            </a:extLst>
+          </p:cNvPr>
+          <p:cNvSpPr txBox="1"/>
+          <p:nvPr/>
+        </p:nvSpPr>
+        <p:spPr>
+          <a:xfrm>
+            <a:off x="3360000" y="1845000"/>
+            <a:ext cx="7704000" cy="1754326"/>
+          </a:xfrm>
+          <a:prstGeom prst="rect">
+            <a:avLst/>
+          </a:prstGeom>
+          <a:noFill/>
+        </p:spPr>
+        <p:txBody>
+          <a:bodyPr wrap="square" rtlCol="0">
+            <a:spAutoFit/>
+          </a:bodyPr>
+          <a:lstStyle/>
+          <a:p>
+            <a:r>
+              <a:rPr lang="en-GB" dirty="0"/>
+              <a:t>Firstly, create a git project:</a:t>
+            </a:r>
+          </a:p>
+          <a:p>
+            <a:pPr marL="742950" lvl="1" indent="-285750">
+              <a:buFont typeface="Arial" panose="020B0604020202020204" pitchFamily="34" charset="0"/>
+              <a:buChar char="•"/>
+            </a:pPr>
+            <a:r>
+              <a:rPr lang="en-GB" dirty="0"/>
+              <a:t>Choose a git host (I’m going to choose GitHub)</a:t>
+            </a:r>
+          </a:p>
+          <a:p>
+            <a:pPr marL="742950" lvl="1" indent="-285750">
+              <a:buFont typeface="Arial" panose="020B0604020202020204" pitchFamily="34" charset="0"/>
+              <a:buChar char="•"/>
+            </a:pPr>
+            <a:r>
+              <a:rPr lang="en-GB" dirty="0"/>
+              <a:t>Create a very basic readme</a:t>
+            </a:r>
+          </a:p>
+          <a:p>
+            <a:pPr marL="742950" lvl="1" indent="-285750">
+              <a:buFont typeface="Arial" panose="020B0604020202020204" pitchFamily="34" charset="0"/>
+              <a:buChar char="•"/>
+            </a:pPr>
+            <a:r>
+              <a:rPr lang="en-GB" dirty="0"/>
+              <a:t>Choose a licence (I’m going to choose the MIT licence)</a:t>
+            </a:r>
+          </a:p>
+          <a:p>
+            <a:pPr marL="742950" lvl="1" indent="-285750">
+              <a:buFont typeface="Arial" panose="020B0604020202020204" pitchFamily="34" charset="0"/>
+              <a:buChar char="•"/>
+            </a:pPr>
+            <a:r>
+              <a:rPr lang="en-GB" dirty="0"/>
+              <a:t>Pull git project into my local</a:t>
+            </a:r>
+          </a:p>
+          <a:p>
+            <a:pPr marL="742950" lvl="1" indent="-285750">
+              <a:buFont typeface="Arial" panose="020B0604020202020204" pitchFamily="34" charset="0"/>
+              <a:buChar char="•"/>
+            </a:pPr>
+            <a:endParaRPr lang="en-AU" dirty="0"/>
+          </a:p>
+        </p:txBody>
+      </p:sp>
+      <p:pic>
+        <p:nvPicPr>
+          <p:cNvPr id="9" name="Picture 10" descr="https://www.younggates.com/uploads/1547662972python2.png">
+            <a:extLst>
+              <a:ext uri="{FF2B5EF4-FFF2-40B4-BE49-F238E27FC236}">
+                <a16:creationId xmlns:a16="http://schemas.microsoft.com/office/drawing/2014/main" id="{BA351A28-7E44-48C0-BCEC-79CCB0BA2036}"/>
+              </a:ext>
+            </a:extLst>
+          </p:cNvPr>
+          <p:cNvPicPr>
+            <a:picLocks noChangeAspect="1" noChangeArrowheads="1"/>
+          </p:cNvPicPr>
+          <p:nvPr/>
+        </p:nvPicPr>
+        <p:blipFill rotWithShape="1">
+          <a:blip r:embed="rId4">
+            <a:extLst>
+              <a:ext uri="{28A0092B-C50C-407E-A947-70E740481C1C}">
+                <a14:useLocalDpi xmlns:a14="http://schemas.microsoft.com/office/drawing/2010/main" val="0"/>
+              </a:ext>
+            </a:extLst>
+          </a:blip>
+          <a:srcRect l="25650" r="23058"/>
+          <a:stretch/>
+        </p:blipFill>
+        <p:spPr bwMode="auto">
+          <a:xfrm>
+            <a:off x="984000" y="4280791"/>
+            <a:ext cx="1465491" cy="1428602"/>
+          </a:xfrm>
+          <a:prstGeom prst="rect">
+            <a:avLst/>
+          </a:prstGeom>
+          <a:noFill/>
+          <a:extLst>
+            <a:ext uri="{909E8E84-426E-40DD-AFC4-6F175D3DCCD1}">
+              <a14:hiddenFill xmlns:a14="http://schemas.microsoft.com/office/drawing/2010/main">
+                <a:solidFill>
+                  <a:srgbClr val="FFFFFF"/>
+                </a:solidFill>
+              </a14:hiddenFill>
+            </a:ext>
+          </a:extLst>
+        </p:spPr>
+      </p:pic>
+      <p:sp>
+        <p:nvSpPr>
+          <p:cNvPr id="64" name="TextBox 63">
+            <a:extLst>
+              <a:ext uri="{FF2B5EF4-FFF2-40B4-BE49-F238E27FC236}">
+                <a16:creationId xmlns:a16="http://schemas.microsoft.com/office/drawing/2014/main" id="{7DE9B2A5-0683-42C1-AC2C-AC3FA3C31BC1}"/>
+              </a:ext>
+            </a:extLst>
+          </p:cNvPr>
+          <p:cNvSpPr txBox="1"/>
+          <p:nvPr/>
+        </p:nvSpPr>
+        <p:spPr>
+          <a:xfrm>
+            <a:off x="3360000" y="4117929"/>
+            <a:ext cx="7704000" cy="1754326"/>
+          </a:xfrm>
+          <a:prstGeom prst="rect">
+            <a:avLst/>
+          </a:prstGeom>
+          <a:noFill/>
+        </p:spPr>
+        <p:txBody>
+          <a:bodyPr wrap="square" rtlCol="0">
+            <a:spAutoFit/>
+          </a:bodyPr>
+          <a:lstStyle/>
+          <a:p>
+            <a:r>
+              <a:rPr lang="en-GB" dirty="0"/>
+              <a:t>Secondly, set up a virtual environment:</a:t>
+            </a:r>
+          </a:p>
+          <a:p>
+            <a:pPr marL="742950" lvl="1" indent="-285750">
+              <a:buFont typeface="Arial" panose="020B0604020202020204" pitchFamily="34" charset="0"/>
+              <a:buChar char="•"/>
+            </a:pPr>
+            <a:r>
+              <a:rPr lang="en-GB" dirty="0"/>
+              <a:t>This is a very good idea for any new python project and it will help you understand the minimum requirements that your new project will require for other machines.</a:t>
+            </a:r>
+          </a:p>
+          <a:p>
+            <a:pPr marL="742950" lvl="1" indent="-285750">
+              <a:buFont typeface="Arial" panose="020B0604020202020204" pitchFamily="34" charset="0"/>
+              <a:buChar char="•"/>
+            </a:pPr>
+            <a:endParaRPr lang="en-GB" dirty="0"/>
+          </a:p>
+          <a:p>
+            <a:pPr marL="742950" lvl="1" indent="-285750">
+              <a:buFont typeface="Arial" panose="020B0604020202020204" pitchFamily="34" charset="0"/>
+              <a:buChar char="•"/>
+            </a:pPr>
+            <a:endParaRPr lang="en-AU" dirty="0"/>
+          </a:p>
+        </p:txBody>
+      </p:sp>
+      <p:pic>
+        <p:nvPicPr>
+          <p:cNvPr id="66" name="Picture 65">
+            <a:extLst>
+              <a:ext uri="{FF2B5EF4-FFF2-40B4-BE49-F238E27FC236}">
+                <a16:creationId xmlns:a16="http://schemas.microsoft.com/office/drawing/2014/main" id="{41E493CA-4316-4639-A900-51DDA93A6801}"/>
+              </a:ext>
+            </a:extLst>
+          </p:cNvPr>
+          <p:cNvPicPr>
+            <a:picLocks noChangeAspect="1"/>
+          </p:cNvPicPr>
+          <p:nvPr/>
+        </p:nvPicPr>
+        <p:blipFill>
+          <a:blip r:embed="rId5"/>
+          <a:stretch>
+            <a:fillRect/>
+          </a:stretch>
+        </p:blipFill>
+        <p:spPr>
+          <a:xfrm>
+            <a:off x="4108570" y="5463735"/>
+            <a:ext cx="3362794" cy="238158"/>
+          </a:xfrm>
+          <a:prstGeom prst="rect">
+            <a:avLst/>
+          </a:prstGeom>
+        </p:spPr>
+      </p:pic>
+      <p:pic>
+        <p:nvPicPr>
+          <p:cNvPr id="68" name="Picture 67">
+            <a:extLst>
+              <a:ext uri="{FF2B5EF4-FFF2-40B4-BE49-F238E27FC236}">
+                <a16:creationId xmlns:a16="http://schemas.microsoft.com/office/drawing/2014/main" id="{013CBD8A-455A-43BF-9EC4-896D1AF7D011}"/>
+              </a:ext>
+            </a:extLst>
+          </p:cNvPr>
+          <p:cNvPicPr>
+            <a:picLocks noChangeAspect="1"/>
+          </p:cNvPicPr>
+          <p:nvPr/>
+        </p:nvPicPr>
+        <p:blipFill>
+          <a:blip r:embed="rId6"/>
+          <a:stretch>
+            <a:fillRect/>
+          </a:stretch>
+        </p:blipFill>
+        <p:spPr>
+          <a:xfrm>
+            <a:off x="4108570" y="5805000"/>
+            <a:ext cx="3600953" cy="695422"/>
+          </a:xfrm>
+          <a:prstGeom prst="rect">
+            <a:avLst/>
+          </a:prstGeom>
+        </p:spPr>
+      </p:pic>
+    </p:spTree>
+    <p:extLst>
+      <p:ext uri="{BB962C8B-B14F-4D97-AF65-F5344CB8AC3E}">
+        <p14:creationId xmlns:p14="http://schemas.microsoft.com/office/powerpoint/2010/main" val="2005609057"/>
+      </p:ext>
+    </p:extLst>
+  </p:cSld>
+  <p:clrMapOvr>
+    <a:masterClrMapping/>
+  </p:clrMapOvr>
+</p:sld>
+</file>
+
+<file path=ppt/slides/slide11.xml><?xml version="1.0" encoding="utf-8"?>
+<p:sld xmlns:a="http://schemas.openxmlformats.org/drawingml/2006/main" xmlns:r="http://schemas.openxmlformats.org/officeDocument/2006/relationships" xmlns:p="http://schemas.openxmlformats.org/presentationml/2006/main">
+  <p:cSld>
+    <p:spTree>
+      <p:nvGrpSpPr>
+        <p:cNvPr id="1" name=""/>
+        <p:cNvGrpSpPr/>
+        <p:nvPr/>
+      </p:nvGrpSpPr>
+      <p:grpSpPr>
+        <a:xfrm>
+          <a:off x="0" y="0"/>
+          <a:ext cx="0" cy="0"/>
+          <a:chOff x="0" y="0"/>
+          <a:chExt cx="0" cy="0"/>
+        </a:xfrm>
+      </p:grpSpPr>
+      <p:sp>
+        <p:nvSpPr>
+          <p:cNvPr id="4" name="Title 3"/>
+          <p:cNvSpPr>
+            <a:spLocks noGrp="1"/>
+          </p:cNvSpPr>
+          <p:nvPr>
+            <p:ph type="title"/>
+          </p:nvPr>
+        </p:nvSpPr>
+        <p:spPr>
+          <a:xfrm>
+            <a:off x="227349" y="0"/>
+            <a:ext cx="11125236" cy="1104900"/>
+          </a:xfrm>
+        </p:spPr>
+        <p:txBody>
+          <a:bodyPr/>
+          <a:lstStyle/>
+          <a:p>
+            <a:br>
+              <a:rPr lang="en-US" dirty="0"/>
+            </a:br>
+            <a:r>
+              <a:rPr lang="en-US" dirty="0"/>
               <a:t>Virtual environment</a:t>
             </a:r>
             <a:endParaRPr lang="en-GB" dirty="0"/>
@@ -28303,7 +29210,7 @@
 </p:sld>
 </file>
 
-<file path=ppt/slides/slide11.xml><?xml version="1.0" encoding="utf-8"?>
+<file path=ppt/slides/slide12.xml><?xml version="1.0" encoding="utf-8"?>
 <p:sld xmlns:a="http://schemas.openxmlformats.org/drawingml/2006/main" xmlns:r="http://schemas.openxmlformats.org/officeDocument/2006/relationships" xmlns:p="http://schemas.openxmlformats.org/presentationml/2006/main">
   <p:cSld>
     <p:spTree>
@@ -28528,7 +29435,231 @@
 </p:sld>
 </file>
 
-<file path=ppt/slides/slide12.xml><?xml version="1.0" encoding="utf-8"?>
+<file path=ppt/slides/slide13.xml><?xml version="1.0" encoding="utf-8"?>
+<p:sld xmlns:a="http://schemas.openxmlformats.org/drawingml/2006/main" xmlns:r="http://schemas.openxmlformats.org/officeDocument/2006/relationships" xmlns:p="http://schemas.openxmlformats.org/presentationml/2006/main">
+  <p:cSld>
+    <p:spTree>
+      <p:nvGrpSpPr>
+        <p:cNvPr id="1" name=""/>
+        <p:cNvGrpSpPr/>
+        <p:nvPr/>
+      </p:nvGrpSpPr>
+      <p:grpSpPr>
+        <a:xfrm>
+          <a:off x="0" y="0"/>
+          <a:ext cx="0" cy="0"/>
+          <a:chOff x="0" y="0"/>
+          <a:chExt cx="0" cy="0"/>
+        </a:xfrm>
+      </p:grpSpPr>
+      <p:sp>
+        <p:nvSpPr>
+          <p:cNvPr id="4" name="Title 3"/>
+          <p:cNvSpPr>
+            <a:spLocks noGrp="1"/>
+          </p:cNvSpPr>
+          <p:nvPr>
+            <p:ph type="title"/>
+          </p:nvPr>
+        </p:nvSpPr>
+        <p:spPr>
+          <a:xfrm>
+            <a:off x="227349" y="0"/>
+            <a:ext cx="11125236" cy="1104900"/>
+          </a:xfrm>
+        </p:spPr>
+        <p:txBody>
+          <a:bodyPr/>
+          <a:lstStyle/>
+          <a:p>
+            <a:br>
+              <a:rPr lang="en-US" dirty="0"/>
+            </a:br>
+            <a:r>
+              <a:rPr lang="en-US" dirty="0"/>
+              <a:t>A note on python IDEs</a:t>
+            </a:r>
+            <a:endParaRPr lang="en-GB" dirty="0"/>
+          </a:p>
+        </p:txBody>
+      </p:sp>
+      <p:sp>
+        <p:nvSpPr>
+          <p:cNvPr id="6" name="Text Placeholder 5"/>
+          <p:cNvSpPr>
+            <a:spLocks noGrp="1"/>
+          </p:cNvSpPr>
+          <p:nvPr>
+            <p:ph type="body" sz="quarter" idx="11"/>
+          </p:nvPr>
+        </p:nvSpPr>
+        <p:spPr/>
+        <p:txBody>
+          <a:bodyPr/>
+          <a:lstStyle/>
+          <a:p>
+            <a:r>
+              <a:rPr lang="en-GB" dirty="0"/>
+              <a:t>For those with no background</a:t>
+            </a:r>
+          </a:p>
+        </p:txBody>
+      </p:sp>
+      <p:pic>
+        <p:nvPicPr>
+          <p:cNvPr id="87044" name="Picture 4">
+            <a:extLst>
+              <a:ext uri="{FF2B5EF4-FFF2-40B4-BE49-F238E27FC236}">
+                <a16:creationId xmlns:a16="http://schemas.microsoft.com/office/drawing/2014/main" id="{93CD71E1-C715-4287-96EF-F210AE43E879}"/>
+              </a:ext>
+            </a:extLst>
+          </p:cNvPr>
+          <p:cNvPicPr>
+            <a:picLocks noChangeAspect="1" noChangeArrowheads="1"/>
+          </p:cNvPicPr>
+          <p:nvPr/>
+        </p:nvPicPr>
+        <p:blipFill>
+          <a:blip r:embed="rId3">
+            <a:extLst>
+              <a:ext uri="{28A0092B-C50C-407E-A947-70E740481C1C}">
+                <a14:useLocalDpi xmlns:a14="http://schemas.microsoft.com/office/drawing/2010/main" val="0"/>
+              </a:ext>
+            </a:extLst>
+          </a:blip>
+          <a:srcRect/>
+          <a:stretch>
+            <a:fillRect/>
+          </a:stretch>
+        </p:blipFill>
+        <p:spPr bwMode="auto">
+          <a:xfrm>
+            <a:off x="4599330" y="2347875"/>
+            <a:ext cx="2709840" cy="3141000"/>
+          </a:xfrm>
+          <a:prstGeom prst="rect">
+            <a:avLst/>
+          </a:prstGeom>
+          <a:noFill/>
+          <a:extLst>
+            <a:ext uri="{909E8E84-426E-40DD-AFC4-6F175D3DCCD1}">
+              <a14:hiddenFill xmlns:a14="http://schemas.microsoft.com/office/drawing/2010/main">
+                <a:solidFill>
+                  <a:srgbClr val="FFFFFF"/>
+                </a:solidFill>
+              </a14:hiddenFill>
+            </a:ext>
+          </a:extLst>
+        </p:spPr>
+      </p:pic>
+      <p:pic>
+        <p:nvPicPr>
+          <p:cNvPr id="87046" name="Picture 6">
+            <a:extLst>
+              <a:ext uri="{FF2B5EF4-FFF2-40B4-BE49-F238E27FC236}">
+                <a16:creationId xmlns:a16="http://schemas.microsoft.com/office/drawing/2014/main" id="{859764BB-9E82-4035-B014-48B16D1BD46A}"/>
+              </a:ext>
+            </a:extLst>
+          </p:cNvPr>
+          <p:cNvPicPr>
+            <a:picLocks noChangeAspect="1" noChangeArrowheads="1"/>
+          </p:cNvPicPr>
+          <p:nvPr/>
+        </p:nvPicPr>
+        <p:blipFill>
+          <a:blip r:embed="rId4">
+            <a:extLst>
+              <a:ext uri="{28A0092B-C50C-407E-A947-70E740481C1C}">
+                <a14:useLocalDpi xmlns:a14="http://schemas.microsoft.com/office/drawing/2010/main" val="0"/>
+              </a:ext>
+            </a:extLst>
+          </a:blip>
+          <a:srcRect/>
+          <a:stretch>
+            <a:fillRect/>
+          </a:stretch>
+        </p:blipFill>
+        <p:spPr bwMode="auto">
+          <a:xfrm>
+            <a:off x="552000" y="2489625"/>
+            <a:ext cx="2857500" cy="2857500"/>
+          </a:xfrm>
+          <a:prstGeom prst="rect">
+            <a:avLst/>
+          </a:prstGeom>
+          <a:noFill/>
+          <a:extLst>
+            <a:ext uri="{909E8E84-426E-40DD-AFC4-6F175D3DCCD1}">
+              <a14:hiddenFill xmlns:a14="http://schemas.microsoft.com/office/drawing/2010/main">
+                <a:solidFill>
+                  <a:srgbClr val="FFFFFF"/>
+                </a:solidFill>
+              </a14:hiddenFill>
+            </a:ext>
+          </a:extLst>
+        </p:spPr>
+      </p:pic>
+      <p:pic>
+        <p:nvPicPr>
+          <p:cNvPr id="87048" name="Picture 8">
+            <a:extLst>
+              <a:ext uri="{FF2B5EF4-FFF2-40B4-BE49-F238E27FC236}">
+                <a16:creationId xmlns:a16="http://schemas.microsoft.com/office/drawing/2014/main" id="{7A20DC2B-5F2D-4191-A0C4-6277517D7FAD}"/>
+              </a:ext>
+            </a:extLst>
+          </p:cNvPr>
+          <p:cNvPicPr>
+            <a:picLocks noChangeAspect="1" noChangeArrowheads="1"/>
+          </p:cNvPicPr>
+          <p:nvPr/>
+        </p:nvPicPr>
+        <p:blipFill>
+          <a:blip r:embed="rId5">
+            <a:extLst>
+              <a:ext uri="{28A0092B-C50C-407E-A947-70E740481C1C}">
+                <a14:useLocalDpi xmlns:a14="http://schemas.microsoft.com/office/drawing/2010/main" val="0"/>
+              </a:ext>
+            </a:extLst>
+          </a:blip>
+          <a:srcRect/>
+          <a:stretch>
+            <a:fillRect/>
+          </a:stretch>
+        </p:blipFill>
+        <p:spPr bwMode="auto">
+          <a:xfrm>
+            <a:off x="8499000" y="2347875"/>
+            <a:ext cx="3141000" cy="3141000"/>
+          </a:xfrm>
+          <a:prstGeom prst="rect">
+            <a:avLst/>
+          </a:prstGeom>
+          <a:noFill/>
+          <a:extLst>
+            <a:ext uri="{909E8E84-426E-40DD-AFC4-6F175D3DCCD1}">
+              <a14:hiddenFill xmlns:a14="http://schemas.microsoft.com/office/drawing/2010/main">
+                <a:solidFill>
+                  <a:srgbClr val="FFFFFF"/>
+                </a:solidFill>
+              </a14:hiddenFill>
+            </a:ext>
+          </a:extLst>
+        </p:spPr>
+      </p:pic>
+    </p:spTree>
+    <p:extLst>
+      <p:ext uri="{BB962C8B-B14F-4D97-AF65-F5344CB8AC3E}">
+        <p14:creationId xmlns:p14="http://schemas.microsoft.com/office/powerpoint/2010/main" val="838978936"/>
+      </p:ext>
+    </p:extLst>
+  </p:cSld>
+  <p:clrMapOvr>
+    <a:masterClrMapping/>
+  </p:clrMapOvr>
+</p:sld>
+</file>
+
+<file path=ppt/slides/slide14.xml><?xml version="1.0" encoding="utf-8"?>
 <p:sld xmlns:a="http://schemas.openxmlformats.org/drawingml/2006/main" xmlns:r="http://schemas.openxmlformats.org/officeDocument/2006/relationships" xmlns:p="http://schemas.openxmlformats.org/presentationml/2006/main">
   <p:cSld>
     <p:spTree>
@@ -28573,7 +29704,7 @@
           <a:graphicData uri="http://schemas.openxmlformats.org/presentationml/2006/ole">
             <mc:AlternateContent xmlns:mc="http://schemas.openxmlformats.org/markup-compatibility/2006">
               <mc:Choice xmlns:v="urn:schemas-microsoft-com:vml" Requires="v">
-                <p:oleObj spid="_x0000_s73735" r:id="rId4" imgW="3085560" imgH="3085560" progId="">
+                <p:oleObj spid="_x0000_s73741" r:id="rId4" imgW="3085560" imgH="3085560" progId="">
                   <p:embed/>
                 </p:oleObj>
               </mc:Choice>
@@ -28734,7 +29865,7 @@
 </p:sld>
 </file>
 
-<file path=ppt/slides/slide13.xml><?xml version="1.0" encoding="utf-8"?>
+<file path=ppt/slides/slide15.xml><?xml version="1.0" encoding="utf-8"?>
 <p:sld xmlns:a="http://schemas.openxmlformats.org/drawingml/2006/main" xmlns:r="http://schemas.openxmlformats.org/officeDocument/2006/relationships" xmlns:p="http://schemas.openxmlformats.org/presentationml/2006/main">
   <p:cSld>
     <p:spTree>
@@ -28779,7 +29910,7 @@
           <a:graphicData uri="http://schemas.openxmlformats.org/presentationml/2006/ole">
             <mc:AlternateContent xmlns:mc="http://schemas.openxmlformats.org/markup-compatibility/2006">
               <mc:Choice xmlns:v="urn:schemas-microsoft-com:vml" Requires="v">
-                <p:oleObj spid="_x0000_s74758" r:id="rId4" imgW="3085560" imgH="3085560" progId="">
+                <p:oleObj spid="_x0000_s74764" r:id="rId4" imgW="3085560" imgH="3085560" progId="">
                   <p:embed/>
                 </p:oleObj>
               </mc:Choice>
@@ -29034,7 +30165,7 @@
 </p:sld>
 </file>
 
-<file path=ppt/slides/slide14.xml><?xml version="1.0" encoding="utf-8"?>
+<file path=ppt/slides/slide16.xml><?xml version="1.0" encoding="utf-8"?>
 <p:sld xmlns:a="http://schemas.openxmlformats.org/drawingml/2006/main" xmlns:r="http://schemas.openxmlformats.org/officeDocument/2006/relationships" xmlns:p="http://schemas.openxmlformats.org/presentationml/2006/main">
   <p:cSld>
     <p:spTree>
@@ -29079,7 +30210,7 @@
           <a:graphicData uri="http://schemas.openxmlformats.org/presentationml/2006/ole">
             <mc:AlternateContent xmlns:mc="http://schemas.openxmlformats.org/markup-compatibility/2006">
               <mc:Choice xmlns:v="urn:schemas-microsoft-com:vml" Requires="v">
-                <p:oleObj spid="_x0000_s75782" r:id="rId4" imgW="3085560" imgH="3085560" progId="">
+                <p:oleObj spid="_x0000_s75788" r:id="rId4" imgW="3085560" imgH="3085560" progId="">
                   <p:embed/>
                 </p:oleObj>
               </mc:Choice>
@@ -29345,7 +30476,7 @@
 </p:sld>
 </file>
 
-<file path=ppt/slides/slide15.xml><?xml version="1.0" encoding="utf-8"?>
+<file path=ppt/slides/slide17.xml><?xml version="1.0" encoding="utf-8"?>
 <p:sld xmlns:a="http://schemas.openxmlformats.org/drawingml/2006/main" xmlns:r="http://schemas.openxmlformats.org/officeDocument/2006/relationships" xmlns:p="http://schemas.openxmlformats.org/presentationml/2006/main">
   <p:cSld>
     <p:spTree>
@@ -29390,7 +30521,7 @@
           <a:graphicData uri="http://schemas.openxmlformats.org/presentationml/2006/ole">
             <mc:AlternateContent xmlns:mc="http://schemas.openxmlformats.org/markup-compatibility/2006">
               <mc:Choice xmlns:v="urn:schemas-microsoft-com:vml" Requires="v">
-                <p:oleObj spid="_x0000_s76806" r:id="rId4" imgW="3085560" imgH="3085560" progId="">
+                <p:oleObj spid="_x0000_s76812" r:id="rId4" imgW="3085560" imgH="3085560" progId="">
                   <p:embed/>
                 </p:oleObj>
               </mc:Choice>
@@ -29636,7 +30767,7 @@
 </p:sld>
 </file>
 
-<file path=ppt/slides/slide16.xml><?xml version="1.0" encoding="utf-8"?>
+<file path=ppt/slides/slide18.xml><?xml version="1.0" encoding="utf-8"?>
 <p:sld xmlns:a="http://schemas.openxmlformats.org/drawingml/2006/main" xmlns:r="http://schemas.openxmlformats.org/officeDocument/2006/relationships" xmlns:p="http://schemas.openxmlformats.org/presentationml/2006/main">
   <p:cSld>
     <p:spTree>
@@ -29855,7 +30986,7 @@
 </p:sld>
 </file>
 
-<file path=ppt/slides/slide17.xml><?xml version="1.0" encoding="utf-8"?>
+<file path=ppt/slides/slide19.xml><?xml version="1.0" encoding="utf-8"?>
 <p:sld xmlns:a="http://schemas.openxmlformats.org/drawingml/2006/main" xmlns:r="http://schemas.openxmlformats.org/officeDocument/2006/relationships" xmlns:p="http://schemas.openxmlformats.org/presentationml/2006/main">
   <p:cSld>
     <p:spTree>
@@ -30083,7 +31214,222 @@
 </p:sld>
 </file>
 
-<file path=ppt/slides/slide18.xml><?xml version="1.0" encoding="utf-8"?>
+<file path=ppt/slides/slide2.xml><?xml version="1.0" encoding="utf-8"?>
+<p:sld xmlns:a="http://schemas.openxmlformats.org/drawingml/2006/main" xmlns:r="http://schemas.openxmlformats.org/officeDocument/2006/relationships" xmlns:p="http://schemas.openxmlformats.org/presentationml/2006/main">
+  <p:cSld>
+    <p:spTree>
+      <p:nvGrpSpPr>
+        <p:cNvPr id="1" name=""/>
+        <p:cNvGrpSpPr/>
+        <p:nvPr/>
+      </p:nvGrpSpPr>
+      <p:grpSpPr>
+        <a:xfrm>
+          <a:off x="0" y="0"/>
+          <a:ext cx="0" cy="0"/>
+          <a:chOff x="0" y="0"/>
+          <a:chExt cx="0" cy="0"/>
+        </a:xfrm>
+      </p:grpSpPr>
+      <p:sp>
+        <p:nvSpPr>
+          <p:cNvPr id="2" name="Text Placeholder 1">
+            <a:extLst>
+              <a:ext uri="{FF2B5EF4-FFF2-40B4-BE49-F238E27FC236}">
+                <a16:creationId xmlns:a16="http://schemas.microsoft.com/office/drawing/2014/main" id="{0D9C05D7-C896-4837-A0B9-B3DC10391FA7}"/>
+              </a:ext>
+            </a:extLst>
+          </p:cNvPr>
+          <p:cNvSpPr>
+            <a:spLocks noGrp="1"/>
+          </p:cNvSpPr>
+          <p:nvPr>
+            <p:ph type="body" sz="quarter" idx="10"/>
+          </p:nvPr>
+        </p:nvSpPr>
+        <p:spPr/>
+        <p:txBody>
+          <a:bodyPr/>
+          <a:lstStyle/>
+          <a:p>
+            <a:r>
+              <a:rPr lang="en-GB" dirty="0"/>
+              <a:t>I am your COVID Marshal while in the office.</a:t>
+            </a:r>
+          </a:p>
+          <a:p>
+            <a:r>
+              <a:rPr lang="en-GB" dirty="0"/>
+              <a:t>Please let me know if you have any of the following symptoms:</a:t>
+            </a:r>
+          </a:p>
+          <a:p>
+            <a:pPr marL="609600" lvl="1" indent="-342900">
+              <a:buFont typeface="Arial" panose="020B0604020202020204" pitchFamily="34" charset="0"/>
+              <a:buChar char="•"/>
+            </a:pPr>
+            <a:r>
+              <a:rPr lang="en-GB" dirty="0"/>
+              <a:t>Fever</a:t>
+            </a:r>
+          </a:p>
+          <a:p>
+            <a:pPr marL="609600" lvl="1" indent="-342900">
+              <a:buFont typeface="Arial" panose="020B0604020202020204" pitchFamily="34" charset="0"/>
+              <a:buChar char="•"/>
+            </a:pPr>
+            <a:r>
+              <a:rPr lang="en-GB" dirty="0"/>
+              <a:t>Cough</a:t>
+            </a:r>
+          </a:p>
+          <a:p>
+            <a:pPr marL="609600" lvl="1" indent="-342900">
+              <a:buFont typeface="Arial" panose="020B0604020202020204" pitchFamily="34" charset="0"/>
+              <a:buChar char="•"/>
+            </a:pPr>
+            <a:r>
+              <a:rPr lang="en-GB" dirty="0"/>
+              <a:t>Shortness of breath</a:t>
+            </a:r>
+          </a:p>
+          <a:p>
+            <a:pPr marL="609600" lvl="1" indent="-342900">
+              <a:buFont typeface="Arial" panose="020B0604020202020204" pitchFamily="34" charset="0"/>
+              <a:buChar char="•"/>
+            </a:pPr>
+            <a:r>
+              <a:rPr lang="en-GB" dirty="0"/>
+              <a:t>Runny nose</a:t>
+            </a:r>
+          </a:p>
+          <a:p>
+            <a:pPr marL="609600" lvl="1" indent="-342900">
+              <a:buFont typeface="Arial" panose="020B0604020202020204" pitchFamily="34" charset="0"/>
+              <a:buChar char="•"/>
+            </a:pPr>
+            <a:r>
+              <a:rPr lang="en-GB" dirty="0"/>
+              <a:t>Headache</a:t>
+            </a:r>
+          </a:p>
+          <a:p>
+            <a:pPr marL="609600" lvl="1" indent="-342900">
+              <a:buFont typeface="Arial" panose="020B0604020202020204" pitchFamily="34" charset="0"/>
+              <a:buChar char="•"/>
+            </a:pPr>
+            <a:r>
+              <a:rPr lang="en-GB" dirty="0"/>
+              <a:t>Sore Throat</a:t>
+            </a:r>
+            <a:endParaRPr lang="en-AU" dirty="0"/>
+          </a:p>
+          <a:p>
+            <a:pPr marL="609600" lvl="1" indent="-342900">
+              <a:buFont typeface="Arial" panose="020B0604020202020204" pitchFamily="34" charset="0"/>
+              <a:buChar char="•"/>
+            </a:pPr>
+            <a:endParaRPr lang="en-GB" dirty="0"/>
+          </a:p>
+          <a:p>
+            <a:pPr lvl="1" indent="0">
+              <a:buNone/>
+            </a:pPr>
+            <a:r>
+              <a:rPr lang="en-GB" dirty="0"/>
+              <a:t>Please social distance, regularly sanitise, try not to handle each other’s pens.</a:t>
+            </a:r>
+          </a:p>
+          <a:p>
+            <a:pPr lvl="1" indent="0">
+              <a:buNone/>
+            </a:pPr>
+            <a:endParaRPr lang="en-GB" dirty="0"/>
+          </a:p>
+          <a:p>
+            <a:pPr lvl="1" indent="0">
+              <a:buNone/>
+            </a:pPr>
+            <a:r>
+              <a:rPr lang="en-GB" dirty="0"/>
+              <a:t>If you feel it’s necessary point out any hazards to me.</a:t>
+            </a:r>
+            <a:endParaRPr lang="en-AU" dirty="0"/>
+          </a:p>
+        </p:txBody>
+      </p:sp>
+      <p:sp>
+        <p:nvSpPr>
+          <p:cNvPr id="3" name="Text Placeholder 2">
+            <a:extLst>
+              <a:ext uri="{FF2B5EF4-FFF2-40B4-BE49-F238E27FC236}">
+                <a16:creationId xmlns:a16="http://schemas.microsoft.com/office/drawing/2014/main" id="{E6BC7323-EDF0-40AC-BE60-32C31D136534}"/>
+              </a:ext>
+            </a:extLst>
+          </p:cNvPr>
+          <p:cNvSpPr>
+            <a:spLocks noGrp="1"/>
+          </p:cNvSpPr>
+          <p:nvPr>
+            <p:ph type="body" sz="quarter" idx="11"/>
+          </p:nvPr>
+        </p:nvSpPr>
+        <p:spPr/>
+        <p:txBody>
+          <a:bodyPr/>
+          <a:lstStyle/>
+          <a:p>
+            <a:r>
+              <a:rPr lang="en-GB" dirty="0"/>
+              <a:t>First some housekeeping</a:t>
+            </a:r>
+            <a:endParaRPr lang="en-AU" dirty="0"/>
+          </a:p>
+        </p:txBody>
+      </p:sp>
+      <p:sp>
+        <p:nvSpPr>
+          <p:cNvPr id="4" name="Title 3">
+            <a:extLst>
+              <a:ext uri="{FF2B5EF4-FFF2-40B4-BE49-F238E27FC236}">
+                <a16:creationId xmlns:a16="http://schemas.microsoft.com/office/drawing/2014/main" id="{6F9828D5-453A-4AAD-9B87-9A78BF61CF80}"/>
+              </a:ext>
+            </a:extLst>
+          </p:cNvPr>
+          <p:cNvSpPr>
+            <a:spLocks noGrp="1"/>
+          </p:cNvSpPr>
+          <p:nvPr>
+            <p:ph type="title"/>
+          </p:nvPr>
+        </p:nvSpPr>
+        <p:spPr/>
+        <p:txBody>
+          <a:bodyPr/>
+          <a:lstStyle/>
+          <a:p>
+            <a:r>
+              <a:rPr lang="en-GB" dirty="0"/>
+              <a:t>Hi!</a:t>
+            </a:r>
+            <a:endParaRPr lang="en-AU" dirty="0"/>
+          </a:p>
+        </p:txBody>
+      </p:sp>
+    </p:spTree>
+    <p:extLst>
+      <p:ext uri="{BB962C8B-B14F-4D97-AF65-F5344CB8AC3E}">
+        <p14:creationId xmlns:p14="http://schemas.microsoft.com/office/powerpoint/2010/main" val="239674036"/>
+      </p:ext>
+    </p:extLst>
+  </p:cSld>
+  <p:clrMapOvr>
+    <a:masterClrMapping/>
+  </p:clrMapOvr>
+</p:sld>
+</file>
+
+<file path=ppt/slides/slide20.xml><?xml version="1.0" encoding="utf-8"?>
 <p:sld xmlns:a="http://schemas.openxmlformats.org/drawingml/2006/main" xmlns:r="http://schemas.openxmlformats.org/officeDocument/2006/relationships" xmlns:p="http://schemas.openxmlformats.org/presentationml/2006/main">
   <p:cSld>
     <p:spTree>
@@ -35597,7 +36943,7 @@
 </p:sld>
 </file>
 
-<file path=ppt/slides/slide19.xml><?xml version="1.0" encoding="utf-8"?>
+<file path=ppt/slides/slide21.xml><?xml version="1.0" encoding="utf-8"?>
 <p:sld xmlns:a="http://schemas.openxmlformats.org/drawingml/2006/main" xmlns:r="http://schemas.openxmlformats.org/officeDocument/2006/relationships" xmlns:p="http://schemas.openxmlformats.org/presentationml/2006/main">
   <p:cSld>
     <p:spTree>
@@ -35642,7 +36988,7 @@
           <a:graphicData uri="http://schemas.openxmlformats.org/presentationml/2006/ole">
             <mc:AlternateContent xmlns:mc="http://schemas.openxmlformats.org/markup-compatibility/2006">
               <mc:Choice xmlns:v="urn:schemas-microsoft-com:vml" Requires="v">
-                <p:oleObj spid="_x0000_s77831" r:id="rId4" imgW="3085560" imgH="3085560" progId="">
+                <p:oleObj spid="_x0000_s77837" r:id="rId4" imgW="3085560" imgH="3085560" progId="">
                   <p:embed/>
                 </p:oleObj>
               </mc:Choice>
@@ -35877,142 +37223,7 @@
 </p:sld>
 </file>
 
-<file path=ppt/slides/slide2.xml><?xml version="1.0" encoding="utf-8"?>
-<p:sld xmlns:a="http://schemas.openxmlformats.org/drawingml/2006/main" xmlns:r="http://schemas.openxmlformats.org/officeDocument/2006/relationships" xmlns:p="http://schemas.openxmlformats.org/presentationml/2006/main">
-  <p:cSld>
-    <p:spTree>
-      <p:nvGrpSpPr>
-        <p:cNvPr id="1" name=""/>
-        <p:cNvGrpSpPr/>
-        <p:nvPr/>
-      </p:nvGrpSpPr>
-      <p:grpSpPr>
-        <a:xfrm>
-          <a:off x="0" y="0"/>
-          <a:ext cx="0" cy="0"/>
-          <a:chOff x="0" y="0"/>
-          <a:chExt cx="0" cy="0"/>
-        </a:xfrm>
-      </p:grpSpPr>
-      <p:sp>
-        <p:nvSpPr>
-          <p:cNvPr id="2" name="Text Placeholder 1">
-            <a:extLst>
-              <a:ext uri="{FF2B5EF4-FFF2-40B4-BE49-F238E27FC236}">
-                <a16:creationId xmlns:a16="http://schemas.microsoft.com/office/drawing/2014/main" id="{0D9C05D7-C896-4837-A0B9-B3DC10391FA7}"/>
-              </a:ext>
-            </a:extLst>
-          </p:cNvPr>
-          <p:cNvSpPr>
-            <a:spLocks noGrp="1"/>
-          </p:cNvSpPr>
-          <p:nvPr>
-            <p:ph type="body" sz="quarter" idx="10"/>
-          </p:nvPr>
-        </p:nvSpPr>
-        <p:spPr/>
-        <p:txBody>
-          <a:bodyPr/>
-          <a:lstStyle/>
-          <a:p>
-            <a:r>
-              <a:rPr lang="en-GB" dirty="0"/>
-              <a:t>COVID</a:t>
-            </a:r>
-          </a:p>
-          <a:p>
-            <a:endParaRPr lang="en-GB" dirty="0"/>
-          </a:p>
-          <a:p>
-            <a:r>
-              <a:rPr lang="en-GB" dirty="0"/>
-              <a:t>Welcome to country?</a:t>
-            </a:r>
-          </a:p>
-          <a:p>
-            <a:endParaRPr lang="en-GB" dirty="0"/>
-          </a:p>
-          <a:p>
-            <a:r>
-              <a:rPr lang="en-GB" dirty="0"/>
-              <a:t>Inclusivity – please respect the diverse experience levels we have today.</a:t>
-            </a:r>
-            <a:endParaRPr lang="en-AU" dirty="0"/>
-          </a:p>
-        </p:txBody>
-      </p:sp>
-      <p:sp>
-        <p:nvSpPr>
-          <p:cNvPr id="3" name="Text Placeholder 2">
-            <a:extLst>
-              <a:ext uri="{FF2B5EF4-FFF2-40B4-BE49-F238E27FC236}">
-                <a16:creationId xmlns:a16="http://schemas.microsoft.com/office/drawing/2014/main" id="{E6BC7323-EDF0-40AC-BE60-32C31D136534}"/>
-              </a:ext>
-            </a:extLst>
-          </p:cNvPr>
-          <p:cNvSpPr>
-            <a:spLocks noGrp="1"/>
-          </p:cNvSpPr>
-          <p:nvPr>
-            <p:ph type="body" sz="quarter" idx="11"/>
-          </p:nvPr>
-        </p:nvSpPr>
-        <p:spPr/>
-        <p:txBody>
-          <a:bodyPr/>
-          <a:lstStyle/>
-          <a:p>
-            <a:r>
-              <a:rPr lang="en-GB" dirty="0"/>
-              <a:t>First some housekeeping</a:t>
-            </a:r>
-            <a:endParaRPr lang="en-AU" dirty="0"/>
-          </a:p>
-        </p:txBody>
-      </p:sp>
-      <p:sp>
-        <p:nvSpPr>
-          <p:cNvPr id="4" name="Title 3">
-            <a:extLst>
-              <a:ext uri="{FF2B5EF4-FFF2-40B4-BE49-F238E27FC236}">
-                <a16:creationId xmlns:a16="http://schemas.microsoft.com/office/drawing/2014/main" id="{6F9828D5-453A-4AAD-9B87-9A78BF61CF80}"/>
-              </a:ext>
-            </a:extLst>
-          </p:cNvPr>
-          <p:cNvSpPr>
-            <a:spLocks noGrp="1"/>
-          </p:cNvSpPr>
-          <p:nvPr>
-            <p:ph type="title"/>
-          </p:nvPr>
-        </p:nvSpPr>
-        <p:spPr/>
-        <p:txBody>
-          <a:bodyPr/>
-          <a:lstStyle/>
-          <a:p>
-            <a:r>
-              <a:rPr lang="en-GB" dirty="0"/>
-              <a:t>Hi!</a:t>
-            </a:r>
-            <a:endParaRPr lang="en-AU" dirty="0"/>
-          </a:p>
-        </p:txBody>
-      </p:sp>
-    </p:spTree>
-    <p:extLst>
-      <p:ext uri="{BB962C8B-B14F-4D97-AF65-F5344CB8AC3E}">
-        <p14:creationId xmlns:p14="http://schemas.microsoft.com/office/powerpoint/2010/main" val="239674036"/>
-      </p:ext>
-    </p:extLst>
-  </p:cSld>
-  <p:clrMapOvr>
-    <a:masterClrMapping/>
-  </p:clrMapOvr>
-</p:sld>
-</file>
-
-<file path=ppt/slides/slide20.xml><?xml version="1.0" encoding="utf-8"?>
+<file path=ppt/slides/slide22.xml><?xml version="1.0" encoding="utf-8"?>
 <p:sld xmlns:a="http://schemas.openxmlformats.org/drawingml/2006/main" xmlns:r="http://schemas.openxmlformats.org/officeDocument/2006/relationships" xmlns:p="http://schemas.openxmlformats.org/presentationml/2006/main">
   <p:cSld>
     <p:spTree>
@@ -36051,7 +37262,7 @@
           <a:graphicData uri="http://schemas.openxmlformats.org/presentationml/2006/ole">
             <mc:AlternateContent xmlns:mc="http://schemas.openxmlformats.org/markup-compatibility/2006">
               <mc:Choice xmlns:v="urn:schemas-microsoft-com:vml" Requires="v">
-                <p:oleObj spid="_x0000_s79879" r:id="rId4" imgW="3085560" imgH="3085560" progId="">
+                <p:oleObj spid="_x0000_s79885" r:id="rId4" imgW="3085560" imgH="3085560" progId="">
                   <p:embed/>
                 </p:oleObj>
               </mc:Choice>
@@ -36270,7 +37481,7 @@
 </p:sld>
 </file>
 
-<file path=ppt/slides/slide21.xml><?xml version="1.0" encoding="utf-8"?>
+<file path=ppt/slides/slide23.xml><?xml version="1.0" encoding="utf-8"?>
 <p:sld xmlns:a="http://schemas.openxmlformats.org/drawingml/2006/main" xmlns:r="http://schemas.openxmlformats.org/officeDocument/2006/relationships" xmlns:p="http://schemas.openxmlformats.org/presentationml/2006/main">
   <p:cSld>
     <p:spTree>
@@ -36614,7 +37825,7 @@
 </p:sld>
 </file>
 
-<file path=ppt/slides/slide22.xml><?xml version="1.0" encoding="utf-8"?>
+<file path=ppt/slides/slide24.xml><?xml version="1.0" encoding="utf-8"?>
 <p:sld xmlns:a="http://schemas.openxmlformats.org/drawingml/2006/main" xmlns:r="http://schemas.openxmlformats.org/officeDocument/2006/relationships" xmlns:p="http://schemas.openxmlformats.org/presentationml/2006/main">
   <p:cSld>
     <p:spTree>
@@ -36929,7 +38140,7 @@
 </p:sld>
 </file>
 
-<file path=ppt/slides/slide23.xml><?xml version="1.0" encoding="utf-8"?>
+<file path=ppt/slides/slide25.xml><?xml version="1.0" encoding="utf-8"?>
 <p:sld xmlns:a="http://schemas.openxmlformats.org/drawingml/2006/main" xmlns:r="http://schemas.openxmlformats.org/officeDocument/2006/relationships" xmlns:p="http://schemas.openxmlformats.org/presentationml/2006/main">
   <p:cSld>
     <p:spTree>
@@ -37134,7 +38345,7 @@
 </p:sld>
 </file>
 
-<file path=ppt/slides/slide24.xml><?xml version="1.0" encoding="utf-8"?>
+<file path=ppt/slides/slide26.xml><?xml version="1.0" encoding="utf-8"?>
 <p:sld xmlns:a="http://schemas.openxmlformats.org/drawingml/2006/main" xmlns:r="http://schemas.openxmlformats.org/officeDocument/2006/relationships" xmlns:p="http://schemas.openxmlformats.org/presentationml/2006/main">
   <p:cSld>
     <p:spTree>
@@ -37333,7 +38544,7 @@
 </p:sld>
 </file>
 
-<file path=ppt/slides/slide25.xml><?xml version="1.0" encoding="utf-8"?>
+<file path=ppt/slides/slide27.xml><?xml version="1.0" encoding="utf-8"?>
 <p:sld xmlns:a="http://schemas.openxmlformats.org/drawingml/2006/main" xmlns:r="http://schemas.openxmlformats.org/officeDocument/2006/relationships" xmlns:p="http://schemas.openxmlformats.org/presentationml/2006/main">
   <p:cSld>
     <p:spTree>
@@ -37583,7 +38794,7 @@
 </p:sld>
 </file>
 
-<file path=ppt/slides/slide26.xml><?xml version="1.0" encoding="utf-8"?>
+<file path=ppt/slides/slide28.xml><?xml version="1.0" encoding="utf-8"?>
 <p:sld xmlns:a="http://schemas.openxmlformats.org/drawingml/2006/main" xmlns:r="http://schemas.openxmlformats.org/officeDocument/2006/relationships" xmlns:p="http://schemas.openxmlformats.org/presentationml/2006/main">
   <p:cSld>
     <p:spTree>
@@ -37685,10 +38896,9 @@
           <a:lstStyle/>
           <a:p>
             <a:r>
-              <a:rPr lang="en-GB" dirty="0" err="1"/>
+              <a:rPr lang="en-GB" dirty="0"/>
               <a:t>PyPI</a:t>
             </a:r>
-            <a:endParaRPr lang="en-GB" dirty="0"/>
           </a:p>
         </p:txBody>
       </p:sp>
@@ -38111,7 +39321,7 @@
 </p:sld>
 </file>
 
-<file path=ppt/slides/slide27.xml><?xml version="1.0" encoding="utf-8"?>
+<file path=ppt/slides/slide29.xml><?xml version="1.0" encoding="utf-8"?>
 <p:sld xmlns:a="http://schemas.openxmlformats.org/drawingml/2006/main" xmlns:r="http://schemas.openxmlformats.org/officeDocument/2006/relationships" xmlns:p="http://schemas.openxmlformats.org/presentationml/2006/main">
   <p:cSld>
     <p:spTree>
@@ -38147,7 +39357,7 @@
         <p:spPr>
           <a:xfrm>
             <a:off x="227348" y="1815351"/>
-            <a:ext cx="11340652" cy="4466201"/>
+            <a:ext cx="9205430" cy="4466201"/>
           </a:xfrm>
         </p:spPr>
         <p:txBody>
@@ -38167,7 +39377,7 @@
           <a:p>
             <a:r>
               <a:rPr lang="en-AU" sz="1800" dirty="0"/>
-              <a:t>We won’t go into too much detail here, but a wheel will wrap our package up into a small set of files that pip will know how to work with and </a:t>
+              <a:t>We won’t go into too much detail here, but a wheel will wrap our package up into a small set of files that pip/python will know how to work with and have a standard format that </a:t>
             </a:r>
             <a:r>
               <a:rPr lang="en-AU" sz="1800" dirty="0" err="1"/>
@@ -38175,11 +39385,8 @@
             </a:r>
             <a:r>
               <a:rPr lang="en-AU" sz="1800" dirty="0"/>
-              <a:t> will know</a:t>
+              <a:t> will know how to host. </a:t>
             </a:r>
-          </a:p>
-          <a:p>
-            <a:endParaRPr lang="en-AU" sz="1800" dirty="0"/>
           </a:p>
           <a:p>
             <a:endParaRPr lang="en-AU" sz="1800" dirty="0"/>
@@ -38187,8 +39394,25 @@
           <a:p>
             <a:r>
               <a:rPr lang="en-AU" sz="1800" dirty="0"/>
-              <a:t>https://packaging.python.org/tutorials/packaging-projects/</a:t>
+              <a:t>Ironically, we need to pip install the wheel package first. Then we will populate a </a:t>
             </a:r>
+            <a:r>
+              <a:rPr lang="en-AU" sz="1800" dirty="0">
+                <a:highlight>
+                  <a:srgbClr val="C0C0C0"/>
+                </a:highlight>
+                <a:latin typeface="Courier New" panose="02070309020205020404" pitchFamily="49" charset="0"/>
+                <a:cs typeface="Courier New" panose="02070309020205020404" pitchFamily="49" charset="0"/>
+              </a:rPr>
+              <a:t>setup.py</a:t>
+            </a:r>
+            <a:r>
+              <a:rPr lang="en-AU" sz="1800" dirty="0"/>
+              <a:t> file which will act as the metadata for our package.</a:t>
+            </a:r>
+          </a:p>
+          <a:p>
+            <a:endParaRPr lang="en-AU" sz="1800" dirty="0"/>
           </a:p>
         </p:txBody>
       </p:sp>
@@ -38262,7 +39486,7 @@
         </p:blipFill>
         <p:spPr>
           <a:xfrm>
-            <a:off x="2280000" y="4717109"/>
+            <a:off x="3389332" y="5001108"/>
             <a:ext cx="4801270" cy="866896"/>
           </a:xfrm>
           <a:prstGeom prst="rect">
@@ -38270,12 +39494,66 @@
           </a:prstGeom>
         </p:spPr>
       </p:pic>
+      <p:sp>
+        <p:nvSpPr>
+          <p:cNvPr id="11" name="TextBox 10">
+            <a:extLst>
+              <a:ext uri="{FF2B5EF4-FFF2-40B4-BE49-F238E27FC236}">
+                <a16:creationId xmlns:a16="http://schemas.microsoft.com/office/drawing/2014/main" id="{EE86D4EE-0516-42FD-AFC0-0822892E7892}"/>
+              </a:ext>
+            </a:extLst>
+          </p:cNvPr>
+          <p:cNvSpPr txBox="1"/>
+          <p:nvPr/>
+        </p:nvSpPr>
+        <p:spPr>
+          <a:xfrm>
+            <a:off x="7392000" y="6311152"/>
+            <a:ext cx="6362700" cy="276999"/>
+          </a:xfrm>
+          <a:prstGeom prst="rect">
+            <a:avLst/>
+          </a:prstGeom>
+          <a:noFill/>
+        </p:spPr>
+        <p:txBody>
+          <a:bodyPr wrap="square">
+            <a:spAutoFit/>
+          </a:bodyPr>
+          <a:lstStyle/>
+          <a:p>
+            <a:r>
+              <a:rPr lang="en-AU" sz="1200" dirty="0">
+                <a:solidFill>
+                  <a:schemeClr val="accent1"/>
+                </a:solidFill>
+                <a:hlinkClick r:id="rId4">
+                  <a:extLst>
+                    <a:ext uri="{A12FA001-AC4F-418D-AE19-62706E023703}">
+                      <ahyp:hlinkClr xmlns:ahyp="http://schemas.microsoft.com/office/drawing/2018/hyperlinkcolor" val="tx"/>
+                    </a:ext>
+                  </a:extLst>
+                </a:hlinkClick>
+              </a:rPr>
+              <a:t>https://packaging.python.org/tutorials/packaging-projects/</a:t>
+            </a:r>
+            <a:r>
+              <a:rPr lang="en-AU" sz="1200" dirty="0">
+                <a:solidFill>
+                  <a:schemeClr val="accent1"/>
+                </a:solidFill>
+              </a:rPr>
+              <a:t> </a:t>
+            </a:r>
+          </a:p>
+        </p:txBody>
+      </p:sp>
       <p:pic>
         <p:nvPicPr>
-          <p:cNvPr id="3" name="Picture 2">
+          <p:cNvPr id="7" name="Picture 6">
             <a:extLst>
               <a:ext uri="{FF2B5EF4-FFF2-40B4-BE49-F238E27FC236}">
-                <a16:creationId xmlns:a16="http://schemas.microsoft.com/office/drawing/2014/main" id="{F055FB77-2532-4D13-B8C4-65252C4F04F6}"/>
+                <a16:creationId xmlns:a16="http://schemas.microsoft.com/office/drawing/2014/main" id="{478CC188-EF03-417A-8527-5C195B61133D}"/>
               </a:ext>
             </a:extLst>
           </p:cNvPr>
@@ -38285,19 +39563,26 @@
           <p:nvPr/>
         </p:nvPicPr>
         <p:blipFill>
-          <a:blip r:embed="rId4"/>
+          <a:blip r:embed="rId5"/>
           <a:stretch>
             <a:fillRect/>
           </a:stretch>
         </p:blipFill>
         <p:spPr>
           <a:xfrm>
-            <a:off x="2280000" y="5823225"/>
-            <a:ext cx="5191850" cy="219106"/>
+            <a:off x="9455222" y="1625450"/>
+            <a:ext cx="2544778" cy="3240000"/>
           </a:xfrm>
           <a:prstGeom prst="rect">
             <a:avLst/>
           </a:prstGeom>
+          <a:effectLst>
+            <a:outerShdw blurRad="50800" dist="38100" dir="5400000" algn="t" rotWithShape="0">
+              <a:prstClr val="black">
+                <a:alpha val="40000"/>
+              </a:prstClr>
+            </a:outerShdw>
+          </a:effectLst>
         </p:spPr>
       </p:pic>
     </p:spTree>
@@ -38313,7 +39598,142 @@
 </p:sld>
 </file>
 
-<file path=ppt/slides/slide28.xml><?xml version="1.0" encoding="utf-8"?>
+<file path=ppt/slides/slide3.xml><?xml version="1.0" encoding="utf-8"?>
+<p:sld xmlns:a="http://schemas.openxmlformats.org/drawingml/2006/main" xmlns:r="http://schemas.openxmlformats.org/officeDocument/2006/relationships" xmlns:p="http://schemas.openxmlformats.org/presentationml/2006/main">
+  <p:cSld>
+    <p:spTree>
+      <p:nvGrpSpPr>
+        <p:cNvPr id="1" name=""/>
+        <p:cNvGrpSpPr/>
+        <p:nvPr/>
+      </p:nvGrpSpPr>
+      <p:grpSpPr>
+        <a:xfrm>
+          <a:off x="0" y="0"/>
+          <a:ext cx="0" cy="0"/>
+          <a:chOff x="0" y="0"/>
+          <a:chExt cx="0" cy="0"/>
+        </a:xfrm>
+      </p:grpSpPr>
+      <p:sp>
+        <p:nvSpPr>
+          <p:cNvPr id="3" name="Text Placeholder 2">
+            <a:extLst>
+              <a:ext uri="{FF2B5EF4-FFF2-40B4-BE49-F238E27FC236}">
+                <a16:creationId xmlns:a16="http://schemas.microsoft.com/office/drawing/2014/main" id="{E6BC7323-EDF0-40AC-BE60-32C31D136534}"/>
+              </a:ext>
+            </a:extLst>
+          </p:cNvPr>
+          <p:cNvSpPr>
+            <a:spLocks noGrp="1"/>
+          </p:cNvSpPr>
+          <p:nvPr>
+            <p:ph type="body" sz="quarter" idx="11"/>
+          </p:nvPr>
+        </p:nvSpPr>
+        <p:spPr/>
+        <p:txBody>
+          <a:bodyPr/>
+          <a:lstStyle/>
+          <a:p>
+            <a:r>
+              <a:rPr lang="en-GB" dirty="0"/>
+              <a:t>Acknowledgement of Country</a:t>
+            </a:r>
+            <a:endParaRPr lang="en-AU" dirty="0"/>
+          </a:p>
+        </p:txBody>
+      </p:sp>
+      <p:sp>
+        <p:nvSpPr>
+          <p:cNvPr id="4" name="Title 3">
+            <a:extLst>
+              <a:ext uri="{FF2B5EF4-FFF2-40B4-BE49-F238E27FC236}">
+                <a16:creationId xmlns:a16="http://schemas.microsoft.com/office/drawing/2014/main" id="{6F9828D5-453A-4AAD-9B87-9A78BF61CF80}"/>
+              </a:ext>
+            </a:extLst>
+          </p:cNvPr>
+          <p:cNvSpPr>
+            <a:spLocks noGrp="1"/>
+          </p:cNvSpPr>
+          <p:nvPr>
+            <p:ph type="title"/>
+          </p:nvPr>
+        </p:nvSpPr>
+        <p:spPr/>
+        <p:txBody>
+          <a:bodyPr/>
+          <a:lstStyle/>
+          <a:p>
+            <a:r>
+              <a:rPr lang="en-GB" dirty="0"/>
+              <a:t>Hi!</a:t>
+            </a:r>
+            <a:endParaRPr lang="en-AU" dirty="0"/>
+          </a:p>
+        </p:txBody>
+      </p:sp>
+      <p:pic>
+        <p:nvPicPr>
+          <p:cNvPr id="86018" name="Picture 2">
+            <a:extLst>
+              <a:ext uri="{FF2B5EF4-FFF2-40B4-BE49-F238E27FC236}">
+                <a16:creationId xmlns:a16="http://schemas.microsoft.com/office/drawing/2014/main" id="{AE71CBD9-39F0-4C7A-A773-B61411634BE1}"/>
+              </a:ext>
+            </a:extLst>
+          </p:cNvPr>
+          <p:cNvPicPr>
+            <a:picLocks noChangeAspect="1" noChangeArrowheads="1"/>
+          </p:cNvPicPr>
+          <p:nvPr/>
+        </p:nvPicPr>
+        <p:blipFill>
+          <a:blip r:embed="rId3">
+            <a:extLst>
+              <a:ext uri="{28A0092B-C50C-407E-A947-70E740481C1C}">
+                <a14:useLocalDpi xmlns:a14="http://schemas.microsoft.com/office/drawing/2010/main" val="0"/>
+              </a:ext>
+            </a:extLst>
+          </a:blip>
+          <a:srcRect/>
+          <a:stretch>
+            <a:fillRect/>
+          </a:stretch>
+        </p:blipFill>
+        <p:spPr bwMode="auto">
+          <a:xfrm>
+            <a:off x="2748000" y="1989000"/>
+            <a:ext cx="6696000" cy="4017600"/>
+          </a:xfrm>
+          <a:prstGeom prst="rect">
+            <a:avLst/>
+          </a:prstGeom>
+          <a:noFill/>
+          <a:extLst>
+            <a:ext uri="{909E8E84-426E-40DD-AFC4-6F175D3DCCD1}">
+              <a14:hiddenFill xmlns:a14="http://schemas.microsoft.com/office/drawing/2010/main">
+                <a:solidFill>
+                  <a:srgbClr val="FFFFFF"/>
+                </a:solidFill>
+              </a14:hiddenFill>
+            </a:ext>
+          </a:extLst>
+        </p:spPr>
+      </p:pic>
+    </p:spTree>
+    <p:extLst>
+      <p:ext uri="{BB962C8B-B14F-4D97-AF65-F5344CB8AC3E}">
+        <p14:creationId xmlns:p14="http://schemas.microsoft.com/office/powerpoint/2010/main" val="2080280728"/>
+      </p:ext>
+    </p:extLst>
+  </p:cSld>
+  <p:clrMapOvr>
+    <a:masterClrMapping/>
+  </p:clrMapOvr>
+</p:sld>
+</file>
+
+<file path=ppt/slides/slide30.xml><?xml version="1.0" encoding="utf-8"?>
 <p:sld xmlns:a="http://schemas.openxmlformats.org/drawingml/2006/main" xmlns:r="http://schemas.openxmlformats.org/officeDocument/2006/relationships" xmlns:p="http://schemas.openxmlformats.org/presentationml/2006/main">
   <p:cSld>
     <p:spTree>
@@ -38451,7 +39871,7 @@
         </p:blipFill>
         <p:spPr bwMode="auto">
           <a:xfrm>
-            <a:off x="8256000" y="3861000"/>
+            <a:off x="4491070" y="3429000"/>
             <a:ext cx="2597793" cy="2597793"/>
           </a:xfrm>
           <a:prstGeom prst="rect">
@@ -38482,7 +39902,7 @@
 </p:sld>
 </file>
 
-<file path=ppt/slides/slide29.xml><?xml version="1.0" encoding="utf-8"?>
+<file path=ppt/slides/slide31.xml><?xml version="1.0" encoding="utf-8"?>
 <p:sld xmlns:a="http://schemas.openxmlformats.org/drawingml/2006/main" xmlns:r="http://schemas.openxmlformats.org/officeDocument/2006/relationships" xmlns:p="http://schemas.openxmlformats.org/presentationml/2006/main">
   <p:cSld>
     <p:spTree>
@@ -38529,8 +39949,19 @@
           <a:p>
             <a:r>
               <a:rPr lang="en-AU" sz="1800" dirty="0"/>
-              <a:t>The standard for creating python packages was set in 2012 with the wheel </a:t>
+              <a:t>Now that we have our setup.py file ready, we can just run this code which will generate our wheel. Once we have our wheel, we can upload the package to </a:t>
             </a:r>
+            <a:r>
+              <a:rPr lang="en-AU" sz="1800" dirty="0" err="1"/>
+              <a:t>test.pypi</a:t>
+            </a:r>
+            <a:r>
+              <a:rPr lang="en-AU" sz="1800" dirty="0"/>
+              <a:t>!</a:t>
+            </a:r>
+          </a:p>
+          <a:p>
+            <a:endParaRPr lang="en-AU" sz="1800" dirty="0"/>
           </a:p>
           <a:p>
             <a:endParaRPr lang="en-AU" sz="1800" dirty="0"/>
@@ -38541,8 +39972,31 @@
           <a:p>
             <a:r>
               <a:rPr lang="en-AU" sz="1800" dirty="0"/>
-              <a:t>https://packaging.python.org/tutorials/packaging-projects/</a:t>
+              <a:t>You’ll notice that there are some new folders that were generated after running this command. We are mostly interested in the new /</a:t>
             </a:r>
+            <a:r>
+              <a:rPr lang="en-AU" sz="1800" dirty="0" err="1"/>
+              <a:t>dist</a:t>
+            </a:r>
+            <a:r>
+              <a:rPr lang="en-AU" sz="1800" dirty="0"/>
+              <a:t> folder and its contents.</a:t>
+            </a:r>
+          </a:p>
+          <a:p>
+            <a:endParaRPr lang="en-AU" sz="1800" dirty="0"/>
+          </a:p>
+          <a:p>
+            <a:endParaRPr lang="en-AU" sz="1800" dirty="0"/>
+          </a:p>
+          <a:p>
+            <a:endParaRPr lang="en-AU" sz="1800" dirty="0"/>
+          </a:p>
+          <a:p>
+            <a:endParaRPr lang="en-AU" sz="1800" dirty="0"/>
+          </a:p>
+          <a:p>
+            <a:endParaRPr lang="en-AU" sz="1800" dirty="0"/>
           </a:p>
         </p:txBody>
       </p:sp>
@@ -38563,7 +40017,195 @@
           <a:p>
             <a:r>
               <a:rPr lang="en-GB" dirty="0"/>
-              <a:t>Putting your package on the internet</a:t>
+              <a:t>And creating a package</a:t>
+            </a:r>
+          </a:p>
+        </p:txBody>
+      </p:sp>
+      <p:sp>
+        <p:nvSpPr>
+          <p:cNvPr id="4" name="Title 3"/>
+          <p:cNvSpPr>
+            <a:spLocks noGrp="1"/>
+          </p:cNvSpPr>
+          <p:nvPr>
+            <p:ph type="title"/>
+          </p:nvPr>
+        </p:nvSpPr>
+        <p:spPr/>
+        <p:txBody>
+          <a:bodyPr/>
+          <a:lstStyle/>
+          <a:p>
+            <a:br>
+              <a:rPr lang="en-US" dirty="0"/>
+            </a:br>
+            <a:r>
+              <a:rPr lang="en-US" dirty="0"/>
+              <a:t>Wheels</a:t>
+            </a:r>
+            <a:endParaRPr lang="en-GB" dirty="0"/>
+          </a:p>
+        </p:txBody>
+      </p:sp>
+      <p:pic>
+        <p:nvPicPr>
+          <p:cNvPr id="3" name="Picture 2">
+            <a:extLst>
+              <a:ext uri="{FF2B5EF4-FFF2-40B4-BE49-F238E27FC236}">
+                <a16:creationId xmlns:a16="http://schemas.microsoft.com/office/drawing/2014/main" id="{CCD5C5F8-663C-4BEB-AFFD-2754768A5C39}"/>
+              </a:ext>
+            </a:extLst>
+          </p:cNvPr>
+          <p:cNvPicPr>
+            <a:picLocks noChangeAspect="1"/>
+          </p:cNvPicPr>
+          <p:nvPr/>
+        </p:nvPicPr>
+        <p:blipFill>
+          <a:blip r:embed="rId3"/>
+          <a:stretch>
+            <a:fillRect/>
+          </a:stretch>
+        </p:blipFill>
+        <p:spPr>
+          <a:xfrm>
+            <a:off x="1704000" y="2709000"/>
+            <a:ext cx="7714176" cy="325553"/>
+          </a:xfrm>
+          <a:prstGeom prst="rect">
+            <a:avLst/>
+          </a:prstGeom>
+        </p:spPr>
+      </p:pic>
+      <p:pic>
+        <p:nvPicPr>
+          <p:cNvPr id="5" name="Picture 4">
+            <a:extLst>
+              <a:ext uri="{FF2B5EF4-FFF2-40B4-BE49-F238E27FC236}">
+                <a16:creationId xmlns:a16="http://schemas.microsoft.com/office/drawing/2014/main" id="{D084E27A-8C99-4C79-A6C1-785A610AA74F}"/>
+              </a:ext>
+            </a:extLst>
+          </p:cNvPr>
+          <p:cNvPicPr>
+            <a:picLocks noChangeAspect="1"/>
+          </p:cNvPicPr>
+          <p:nvPr/>
+        </p:nvPicPr>
+        <p:blipFill>
+          <a:blip r:embed="rId4"/>
+          <a:stretch>
+            <a:fillRect/>
+          </a:stretch>
+        </p:blipFill>
+        <p:spPr>
+          <a:xfrm>
+            <a:off x="2321061" y="4380612"/>
+            <a:ext cx="7097115" cy="1295581"/>
+          </a:xfrm>
+          <a:prstGeom prst="rect">
+            <a:avLst/>
+          </a:prstGeom>
+        </p:spPr>
+      </p:pic>
+    </p:spTree>
+    <p:extLst>
+      <p:ext uri="{BB962C8B-B14F-4D97-AF65-F5344CB8AC3E}">
+        <p14:creationId xmlns:p14="http://schemas.microsoft.com/office/powerpoint/2010/main" val="3557031453"/>
+      </p:ext>
+    </p:extLst>
+  </p:cSld>
+  <p:clrMapOvr>
+    <a:masterClrMapping/>
+  </p:clrMapOvr>
+</p:sld>
+</file>
+
+<file path=ppt/slides/slide32.xml><?xml version="1.0" encoding="utf-8"?>
+<p:sld xmlns:a="http://schemas.openxmlformats.org/drawingml/2006/main" xmlns:r="http://schemas.openxmlformats.org/officeDocument/2006/relationships" xmlns:p="http://schemas.openxmlformats.org/presentationml/2006/main">
+  <p:cSld>
+    <p:spTree>
+      <p:nvGrpSpPr>
+        <p:cNvPr id="1" name=""/>
+        <p:cNvGrpSpPr/>
+        <p:nvPr/>
+      </p:nvGrpSpPr>
+      <p:grpSpPr>
+        <a:xfrm>
+          <a:off x="0" y="0"/>
+          <a:ext cx="0" cy="0"/>
+          <a:chOff x="0" y="0"/>
+          <a:chExt cx="0" cy="0"/>
+        </a:xfrm>
+      </p:grpSpPr>
+      <p:sp>
+        <p:nvSpPr>
+          <p:cNvPr id="9" name="Text Placeholder 8">
+            <a:extLst>
+              <a:ext uri="{FF2B5EF4-FFF2-40B4-BE49-F238E27FC236}">
+                <a16:creationId xmlns:a16="http://schemas.microsoft.com/office/drawing/2014/main" id="{6319479D-CA1D-43C1-92A0-1F6F7513D520}"/>
+              </a:ext>
+            </a:extLst>
+          </p:cNvPr>
+          <p:cNvSpPr>
+            <a:spLocks noGrp="1"/>
+          </p:cNvSpPr>
+          <p:nvPr>
+            <p:ph type="body" sz="quarter" idx="10"/>
+          </p:nvPr>
+        </p:nvSpPr>
+        <p:spPr>
+          <a:xfrm>
+            <a:off x="227348" y="1815351"/>
+            <a:ext cx="11340652" cy="4466201"/>
+          </a:xfrm>
+        </p:spPr>
+        <p:txBody>
+          <a:bodyPr>
+            <a:normAutofit/>
+          </a:bodyPr>
+          <a:lstStyle/>
+          <a:p>
+            <a:r>
+              <a:rPr lang="en-AU" sz="1800" dirty="0"/>
+              <a:t>Finally, we just need to get the package onto the internet. This bit is super simple if everything before this step has gone to plan, but can sometimes be a bit fiddly if you’re new and missed/messed up a step.</a:t>
+            </a:r>
+          </a:p>
+          <a:p>
+            <a:endParaRPr lang="en-AU" sz="1800" dirty="0"/>
+          </a:p>
+          <a:p>
+            <a:r>
+              <a:rPr lang="en-AU" sz="1800" dirty="0"/>
+              <a:t>In practice, we will need to setup an account with a username, password and go through account verification – but that would make for a very boring exercise. We’ll just use my personal one for now, but reach out if you’re finding this bit difficult and I’ll do what I can to help.</a:t>
+            </a:r>
+          </a:p>
+          <a:p>
+            <a:endParaRPr lang="en-AU" sz="1800" dirty="0"/>
+          </a:p>
+          <a:p>
+            <a:endParaRPr lang="en-AU" sz="1800" dirty="0"/>
+          </a:p>
+        </p:txBody>
+      </p:sp>
+      <p:sp>
+        <p:nvSpPr>
+          <p:cNvPr id="6" name="Text Placeholder 5"/>
+          <p:cNvSpPr>
+            <a:spLocks noGrp="1"/>
+          </p:cNvSpPr>
+          <p:nvPr>
+            <p:ph type="body" sz="quarter" idx="11"/>
+          </p:nvPr>
+        </p:nvSpPr>
+        <p:spPr/>
+        <p:txBody>
+          <a:bodyPr/>
+          <a:lstStyle/>
+          <a:p>
+            <a:r>
+              <a:rPr lang="en-GB" dirty="0"/>
+              <a:t>Bear with me…</a:t>
             </a:r>
           </a:p>
         </p:txBody>
@@ -38594,66 +40236,6 @@
           </a:p>
         </p:txBody>
       </p:sp>
-      <p:pic>
-        <p:nvPicPr>
-          <p:cNvPr id="2" name="Picture 1">
-            <a:extLst>
-              <a:ext uri="{FF2B5EF4-FFF2-40B4-BE49-F238E27FC236}">
-                <a16:creationId xmlns:a16="http://schemas.microsoft.com/office/drawing/2014/main" id="{074D9C46-6903-4972-A98F-53481E7C7802}"/>
-              </a:ext>
-            </a:extLst>
-          </p:cNvPr>
-          <p:cNvPicPr>
-            <a:picLocks noChangeAspect="1"/>
-          </p:cNvPicPr>
-          <p:nvPr/>
-        </p:nvPicPr>
-        <p:blipFill>
-          <a:blip r:embed="rId3"/>
-          <a:stretch>
-            <a:fillRect/>
-          </a:stretch>
-        </p:blipFill>
-        <p:spPr>
-          <a:xfrm>
-            <a:off x="3497039" y="3775312"/>
-            <a:ext cx="4801270" cy="866896"/>
-          </a:xfrm>
-          <a:prstGeom prst="rect">
-            <a:avLst/>
-          </a:prstGeom>
-        </p:spPr>
-      </p:pic>
-      <p:pic>
-        <p:nvPicPr>
-          <p:cNvPr id="3" name="Picture 2">
-            <a:extLst>
-              <a:ext uri="{FF2B5EF4-FFF2-40B4-BE49-F238E27FC236}">
-                <a16:creationId xmlns:a16="http://schemas.microsoft.com/office/drawing/2014/main" id="{F055FB77-2532-4D13-B8C4-65252C4F04F6}"/>
-              </a:ext>
-            </a:extLst>
-          </p:cNvPr>
-          <p:cNvPicPr>
-            <a:picLocks noChangeAspect="1"/>
-          </p:cNvPicPr>
-          <p:nvPr/>
-        </p:nvPicPr>
-        <p:blipFill>
-          <a:blip r:embed="rId4"/>
-          <a:stretch>
-            <a:fillRect/>
-          </a:stretch>
-        </p:blipFill>
-        <p:spPr>
-          <a:xfrm>
-            <a:off x="3301749" y="5157000"/>
-            <a:ext cx="5191850" cy="219106"/>
-          </a:xfrm>
-          <a:prstGeom prst="rect">
-            <a:avLst/>
-          </a:prstGeom>
-        </p:spPr>
-      </p:pic>
     </p:spTree>
     <p:extLst>
       <p:ext uri="{BB962C8B-B14F-4D97-AF65-F5344CB8AC3E}">
@@ -38667,7 +40249,7 @@
 </p:sld>
 </file>
 
-<file path=ppt/slides/slide3.xml><?xml version="1.0" encoding="utf-8"?>
+<file path=ppt/slides/slide33.xml><?xml version="1.0" encoding="utf-8"?>
 <p:sld xmlns:a="http://schemas.openxmlformats.org/drawingml/2006/main" xmlns:r="http://schemas.openxmlformats.org/officeDocument/2006/relationships" xmlns:p="http://schemas.openxmlformats.org/presentationml/2006/main">
   <p:cSld>
     <p:spTree>
@@ -38704,10 +40286,14 @@
           <a:bodyPr/>
           <a:lstStyle/>
           <a:p>
+            <a:br>
+              <a:rPr lang="en-US" dirty="0"/>
+            </a:br>
             <a:r>
               <a:rPr lang="en-US" dirty="0"/>
-              <a:t>import this: building your first python package</a:t>
+              <a:t>The Grand Finale!</a:t>
             </a:r>
+            <a:endParaRPr lang="en-GB" dirty="0"/>
           </a:p>
         </p:txBody>
       </p:sp>
@@ -38728,17 +40314,56 @@
           <a:p>
             <a:r>
               <a:rPr lang="en-GB" dirty="0"/>
-              <a:t>An overview of today</a:t>
+              <a:t>Activity</a:t>
+            </a:r>
+          </a:p>
+        </p:txBody>
+      </p:sp>
+      <p:sp>
+        <p:nvSpPr>
+          <p:cNvPr id="2" name="TextBox 1">
+            <a:extLst>
+              <a:ext uri="{FF2B5EF4-FFF2-40B4-BE49-F238E27FC236}">
+                <a16:creationId xmlns:a16="http://schemas.microsoft.com/office/drawing/2014/main" id="{EA248A2E-9A64-4A3E-8590-A543E9DCB658}"/>
+              </a:ext>
+            </a:extLst>
+          </p:cNvPr>
+          <p:cNvSpPr txBox="1"/>
+          <p:nvPr/>
+        </p:nvSpPr>
+        <p:spPr>
+          <a:xfrm>
+            <a:off x="660000" y="1557000"/>
+            <a:ext cx="10872000" cy="1015663"/>
+          </a:xfrm>
+          <a:prstGeom prst="rect">
+            <a:avLst/>
+          </a:prstGeom>
+          <a:noFill/>
+        </p:spPr>
+        <p:txBody>
+          <a:bodyPr wrap="square" rtlCol="0">
+            <a:spAutoFit/>
+          </a:bodyPr>
+          <a:lstStyle/>
+          <a:p>
+            <a:r>
+              <a:rPr lang="en-GB" sz="2000" b="1" dirty="0"/>
+              <a:t>Task:</a:t>
+            </a:r>
+            <a:r>
+              <a:rPr lang="en-GB" sz="2000" dirty="0"/>
+              <a:t> I couldn’t think of a good way to do this so you’re just going to have to 	watch me fiddle with twine. Below are some snips of what it looks like when 	it’s working. Compelling content, I know!</a:t>
             </a:r>
           </a:p>
         </p:txBody>
       </p:sp>
       <p:pic>
         <p:nvPicPr>
-          <p:cNvPr id="3" name="Picture 2" descr="Icon&#10;&#10;Description automatically generated">
+          <p:cNvPr id="5" name="Picture 4">
             <a:extLst>
               <a:ext uri="{FF2B5EF4-FFF2-40B4-BE49-F238E27FC236}">
-                <a16:creationId xmlns:a16="http://schemas.microsoft.com/office/drawing/2014/main" id="{6082D4AC-5102-413D-BA6F-480AAECF013A}"/>
+                <a16:creationId xmlns:a16="http://schemas.microsoft.com/office/drawing/2014/main" id="{A1D2A419-2721-43BF-912E-74D0C2B27683}"/>
               </a:ext>
             </a:extLst>
           </p:cNvPr>
@@ -38748,21 +40373,15 @@
           <p:nvPr/>
         </p:nvPicPr>
         <p:blipFill>
-          <a:blip r:embed="rId3">
-            <a:extLst>
-              <a:ext uri="{28A0092B-C50C-407E-A947-70E740481C1C}">
-                <a14:useLocalDpi xmlns:a14="http://schemas.microsoft.com/office/drawing/2010/main" val="0"/>
-              </a:ext>
-            </a:extLst>
-          </a:blip>
+          <a:blip r:embed="rId3"/>
           <a:stretch>
             <a:fillRect/>
           </a:stretch>
         </p:blipFill>
         <p:spPr>
           <a:xfrm>
-            <a:off x="912000" y="3157757"/>
-            <a:ext cx="1296000" cy="1296000"/>
+            <a:off x="2136000" y="2877209"/>
+            <a:ext cx="6906400" cy="1253177"/>
           </a:xfrm>
           <a:prstGeom prst="rect">
             <a:avLst/>
@@ -38771,277 +40390,45 @@
       </p:pic>
       <p:pic>
         <p:nvPicPr>
-          <p:cNvPr id="68610" name="Picture 2">
+          <p:cNvPr id="7" name="Picture 6">
             <a:extLst>
               <a:ext uri="{FF2B5EF4-FFF2-40B4-BE49-F238E27FC236}">
-                <a16:creationId xmlns:a16="http://schemas.microsoft.com/office/drawing/2014/main" id="{698A9810-4D47-4AEA-8B82-86D9636CD0F3}"/>
+                <a16:creationId xmlns:a16="http://schemas.microsoft.com/office/drawing/2014/main" id="{7F6D3A06-F29A-4C61-9BA9-CA04B7F5C0D0}"/>
               </a:ext>
             </a:extLst>
           </p:cNvPr>
           <p:cNvPicPr>
-            <a:picLocks noChangeAspect="1" noChangeArrowheads="1"/>
+            <a:picLocks noChangeAspect="1"/>
           </p:cNvPicPr>
           <p:nvPr/>
         </p:nvPicPr>
-        <p:blipFill rotWithShape="1">
-          <a:blip r:embed="rId4">
-            <a:extLst>
-              <a:ext uri="{28A0092B-C50C-407E-A947-70E740481C1C}">
-                <a14:useLocalDpi xmlns:a14="http://schemas.microsoft.com/office/drawing/2010/main" val="0"/>
-              </a:ext>
-            </a:extLst>
-          </a:blip>
-          <a:srcRect l="21260" t="7717" r="22045" b="31495"/>
-          <a:stretch/>
+        <p:blipFill>
+          <a:blip r:embed="rId4"/>
+          <a:stretch>
+            <a:fillRect/>
+          </a:stretch>
         </p:blipFill>
-        <p:spPr bwMode="auto">
+        <p:spPr>
           <a:xfrm>
-            <a:off x="3399503" y="2879357"/>
-            <a:ext cx="1728000" cy="1852801"/>
+            <a:off x="2811192" y="4273238"/>
+            <a:ext cx="5957549" cy="2279062"/>
           </a:xfrm>
           <a:prstGeom prst="rect">
             <a:avLst/>
           </a:prstGeom>
-          <a:noFill/>
-          <a:extLst>
-            <a:ext uri="{909E8E84-426E-40DD-AFC4-6F175D3DCCD1}">
-              <a14:hiddenFill xmlns:a14="http://schemas.microsoft.com/office/drawing/2010/main">
-                <a:solidFill>
-                  <a:srgbClr val="FFFFFF"/>
-                </a:solidFill>
-              </a14:hiddenFill>
-            </a:ext>
-          </a:extLst>
+          <a:effectLst>
+            <a:outerShdw blurRad="50800" dist="38100" dir="5400000" algn="t" rotWithShape="0">
+              <a:prstClr val="black">
+                <a:alpha val="40000"/>
+              </a:prstClr>
+            </a:outerShdw>
+          </a:effectLst>
         </p:spPr>
       </p:pic>
-      <p:pic>
-        <p:nvPicPr>
-          <p:cNvPr id="5" name="Picture 10" descr="https://www.younggates.com/uploads/1547662972python2.png">
-            <a:extLst>
-              <a:ext uri="{FF2B5EF4-FFF2-40B4-BE49-F238E27FC236}">
-                <a16:creationId xmlns:a16="http://schemas.microsoft.com/office/drawing/2014/main" id="{1BE76E22-6C25-488F-A2D2-202E15B8DE90}"/>
-              </a:ext>
-            </a:extLst>
-          </p:cNvPr>
-          <p:cNvPicPr>
-            <a:picLocks noChangeAspect="1" noChangeArrowheads="1"/>
-          </p:cNvPicPr>
-          <p:nvPr/>
-        </p:nvPicPr>
-        <p:blipFill rotWithShape="1">
-          <a:blip r:embed="rId5">
-            <a:extLst>
-              <a:ext uri="{28A0092B-C50C-407E-A947-70E740481C1C}">
-                <a14:useLocalDpi xmlns:a14="http://schemas.microsoft.com/office/drawing/2010/main" val="0"/>
-              </a:ext>
-            </a:extLst>
-          </a:blip>
-          <a:srcRect l="25650" r="23058"/>
-          <a:stretch/>
-        </p:blipFill>
-        <p:spPr bwMode="auto">
-          <a:xfrm>
-            <a:off x="6319006" y="3091456"/>
-            <a:ext cx="1465491" cy="1428602"/>
-          </a:xfrm>
-          <a:prstGeom prst="rect">
-            <a:avLst/>
-          </a:prstGeom>
-          <a:noFill/>
-          <a:extLst>
-            <a:ext uri="{909E8E84-426E-40DD-AFC4-6F175D3DCCD1}">
-              <a14:hiddenFill xmlns:a14="http://schemas.microsoft.com/office/drawing/2010/main">
-                <a:solidFill>
-                  <a:srgbClr val="FFFFFF"/>
-                </a:solidFill>
-              </a14:hiddenFill>
-            </a:ext>
-          </a:extLst>
-        </p:spPr>
-      </p:pic>
-      <p:pic>
-        <p:nvPicPr>
-          <p:cNvPr id="68612" name="Picture 4">
-            <a:extLst>
-              <a:ext uri="{FF2B5EF4-FFF2-40B4-BE49-F238E27FC236}">
-                <a16:creationId xmlns:a16="http://schemas.microsoft.com/office/drawing/2014/main" id="{127A8003-FE9F-4EA4-99DD-A9FCF12AC114}"/>
-              </a:ext>
-            </a:extLst>
-          </p:cNvPr>
-          <p:cNvPicPr>
-            <a:picLocks noChangeAspect="1" noChangeArrowheads="1"/>
-          </p:cNvPicPr>
-          <p:nvPr/>
-        </p:nvPicPr>
-        <p:blipFill>
-          <a:blip r:embed="rId6">
-            <a:extLst>
-              <a:ext uri="{28A0092B-C50C-407E-A947-70E740481C1C}">
-                <a14:useLocalDpi xmlns:a14="http://schemas.microsoft.com/office/drawing/2010/main" val="0"/>
-              </a:ext>
-            </a:extLst>
-          </a:blip>
-          <a:srcRect/>
-          <a:stretch>
-            <a:fillRect/>
-          </a:stretch>
-        </p:blipFill>
-        <p:spPr bwMode="auto">
-          <a:xfrm>
-            <a:off x="8976000" y="2868857"/>
-            <a:ext cx="1873800" cy="1873800"/>
-          </a:xfrm>
-          <a:prstGeom prst="rect">
-            <a:avLst/>
-          </a:prstGeom>
-          <a:noFill/>
-          <a:extLst>
-            <a:ext uri="{909E8E84-426E-40DD-AFC4-6F175D3DCCD1}">
-              <a14:hiddenFill xmlns:a14="http://schemas.microsoft.com/office/drawing/2010/main">
-                <a:solidFill>
-                  <a:srgbClr val="FFFFFF"/>
-                </a:solidFill>
-              </a14:hiddenFill>
-            </a:ext>
-          </a:extLst>
-        </p:spPr>
-      </p:pic>
-      <p:cxnSp>
-        <p:nvCxnSpPr>
-          <p:cNvPr id="10" name="Straight Arrow Connector 9">
-            <a:extLst>
-              <a:ext uri="{FF2B5EF4-FFF2-40B4-BE49-F238E27FC236}">
-                <a16:creationId xmlns:a16="http://schemas.microsoft.com/office/drawing/2014/main" id="{BC4D3116-9E58-4D3B-8497-4EAA8DA99651}"/>
-              </a:ext>
-            </a:extLst>
-          </p:cNvPr>
-          <p:cNvCxnSpPr>
-            <a:cxnSpLocks/>
-          </p:cNvCxnSpPr>
-          <p:nvPr/>
-        </p:nvCxnSpPr>
-        <p:spPr>
-          <a:xfrm>
-            <a:off x="2496000" y="3789000"/>
-            <a:ext cx="936000" cy="0"/>
-          </a:xfrm>
-          <a:prstGeom prst="straightConnector1">
-            <a:avLst/>
-          </a:prstGeom>
-          <a:ln w="76200">
-            <a:solidFill>
-              <a:srgbClr val="4701A7"/>
-            </a:solidFill>
-            <a:tailEnd type="triangle"/>
-          </a:ln>
-        </p:spPr>
-        <p:style>
-          <a:lnRef idx="1">
-            <a:schemeClr val="accent1"/>
-          </a:lnRef>
-          <a:fillRef idx="0">
-            <a:schemeClr val="accent1"/>
-          </a:fillRef>
-          <a:effectRef idx="0">
-            <a:schemeClr val="accent1"/>
-          </a:effectRef>
-          <a:fontRef idx="minor">
-            <a:schemeClr val="tx1"/>
-          </a:fontRef>
-        </p:style>
-      </p:cxnSp>
-      <p:cxnSp>
-        <p:nvCxnSpPr>
-          <p:cNvPr id="11" name="Straight Arrow Connector 10">
-            <a:extLst>
-              <a:ext uri="{FF2B5EF4-FFF2-40B4-BE49-F238E27FC236}">
-                <a16:creationId xmlns:a16="http://schemas.microsoft.com/office/drawing/2014/main" id="{065CAD99-A58D-49BE-A1E5-F7F3E5B6F993}"/>
-              </a:ext>
-            </a:extLst>
-          </p:cNvPr>
-          <p:cNvCxnSpPr>
-            <a:cxnSpLocks/>
-          </p:cNvCxnSpPr>
-          <p:nvPr/>
-        </p:nvCxnSpPr>
-        <p:spPr>
-          <a:xfrm>
-            <a:off x="5232000" y="3789000"/>
-            <a:ext cx="936000" cy="0"/>
-          </a:xfrm>
-          <a:prstGeom prst="straightConnector1">
-            <a:avLst/>
-          </a:prstGeom>
-          <a:ln w="76200">
-            <a:solidFill>
-              <a:srgbClr val="4701A7"/>
-            </a:solidFill>
-            <a:tailEnd type="triangle"/>
-          </a:ln>
-        </p:spPr>
-        <p:style>
-          <a:lnRef idx="1">
-            <a:schemeClr val="accent1"/>
-          </a:lnRef>
-          <a:fillRef idx="0">
-            <a:schemeClr val="accent1"/>
-          </a:fillRef>
-          <a:effectRef idx="0">
-            <a:schemeClr val="accent1"/>
-          </a:effectRef>
-          <a:fontRef idx="minor">
-            <a:schemeClr val="tx1"/>
-          </a:fontRef>
-        </p:style>
-      </p:cxnSp>
-      <p:cxnSp>
-        <p:nvCxnSpPr>
-          <p:cNvPr id="12" name="Straight Arrow Connector 11">
-            <a:extLst>
-              <a:ext uri="{FF2B5EF4-FFF2-40B4-BE49-F238E27FC236}">
-                <a16:creationId xmlns:a16="http://schemas.microsoft.com/office/drawing/2014/main" id="{4AC984CF-4C78-4A82-AE49-FF4C8B42CF94}"/>
-              </a:ext>
-            </a:extLst>
-          </p:cNvPr>
-          <p:cNvCxnSpPr>
-            <a:cxnSpLocks/>
-          </p:cNvCxnSpPr>
-          <p:nvPr/>
-        </p:nvCxnSpPr>
-        <p:spPr>
-          <a:xfrm>
-            <a:off x="8040000" y="3789000"/>
-            <a:ext cx="936000" cy="0"/>
-          </a:xfrm>
-          <a:prstGeom prst="straightConnector1">
-            <a:avLst/>
-          </a:prstGeom>
-          <a:ln w="76200">
-            <a:solidFill>
-              <a:srgbClr val="4701A7"/>
-            </a:solidFill>
-            <a:tailEnd type="triangle"/>
-          </a:ln>
-        </p:spPr>
-        <p:style>
-          <a:lnRef idx="1">
-            <a:schemeClr val="accent1"/>
-          </a:lnRef>
-          <a:fillRef idx="0">
-            <a:schemeClr val="accent1"/>
-          </a:fillRef>
-          <a:effectRef idx="0">
-            <a:schemeClr val="accent1"/>
-          </a:effectRef>
-          <a:fontRef idx="minor">
-            <a:schemeClr val="tx1"/>
-          </a:fontRef>
-        </p:style>
-      </p:cxnSp>
     </p:spTree>
     <p:extLst>
       <p:ext uri="{BB962C8B-B14F-4D97-AF65-F5344CB8AC3E}">
-        <p14:creationId xmlns:p14="http://schemas.microsoft.com/office/powerpoint/2010/main" val="3348113440"/>
+        <p14:creationId xmlns:p14="http://schemas.microsoft.com/office/powerpoint/2010/main" val="3648582854"/>
       </p:ext>
     </p:extLst>
   </p:cSld>
@@ -39051,7 +40438,7 @@
 </p:sld>
 </file>
 
-<file path=ppt/slides/slide30.xml><?xml version="1.0" encoding="utf-8"?>
+<file path=ppt/slides/slide34.xml><?xml version="1.0" encoding="utf-8"?>
 <p:sld xmlns:a="http://schemas.openxmlformats.org/drawingml/2006/main" xmlns:r="http://schemas.openxmlformats.org/officeDocument/2006/relationships" xmlns:p="http://schemas.openxmlformats.org/presentationml/2006/main">
   <p:cSld>
     <p:spTree>
@@ -39251,7 +40638,7 @@
 </p:sld>
 </file>
 
-<file path=ppt/slides/slide31.xml><?xml version="1.0" encoding="utf-8"?>
+<file path=ppt/slides/slide35.xml><?xml version="1.0" encoding="utf-8"?>
 <p:sld xmlns:a="http://schemas.openxmlformats.org/drawingml/2006/main" xmlns:r="http://schemas.openxmlformats.org/officeDocument/2006/relationships" xmlns:p="http://schemas.openxmlformats.org/presentationml/2006/main">
   <p:cSld>
     <p:spTree>
@@ -39682,7 +41069,7 @@
 </p:sld>
 </file>
 
-<file path=ppt/slides/slide32.xml><?xml version="1.0" encoding="utf-8"?>
+<file path=ppt/slides/slide36.xml><?xml version="1.0" encoding="utf-8"?>
 <p:sld xmlns:a="http://schemas.openxmlformats.org/drawingml/2006/main" xmlns:r="http://schemas.openxmlformats.org/officeDocument/2006/relationships" xmlns:p="http://schemas.openxmlformats.org/presentationml/2006/main">
   <p:cSld>
     <p:spTree>
@@ -39708,6 +41095,390 @@
 </file>
 
 <file path=ppt/slides/slide4.xml><?xml version="1.0" encoding="utf-8"?>
+<p:sld xmlns:a="http://schemas.openxmlformats.org/drawingml/2006/main" xmlns:r="http://schemas.openxmlformats.org/officeDocument/2006/relationships" xmlns:p="http://schemas.openxmlformats.org/presentationml/2006/main">
+  <p:cSld>
+    <p:spTree>
+      <p:nvGrpSpPr>
+        <p:cNvPr id="1" name=""/>
+        <p:cNvGrpSpPr/>
+        <p:nvPr/>
+      </p:nvGrpSpPr>
+      <p:grpSpPr>
+        <a:xfrm>
+          <a:off x="0" y="0"/>
+          <a:ext cx="0" cy="0"/>
+          <a:chOff x="0" y="0"/>
+          <a:chExt cx="0" cy="0"/>
+        </a:xfrm>
+      </p:grpSpPr>
+      <p:sp>
+        <p:nvSpPr>
+          <p:cNvPr id="4" name="Title 3"/>
+          <p:cNvSpPr>
+            <a:spLocks noGrp="1"/>
+          </p:cNvSpPr>
+          <p:nvPr>
+            <p:ph type="title"/>
+          </p:nvPr>
+        </p:nvSpPr>
+        <p:spPr>
+          <a:xfrm>
+            <a:off x="227349" y="0"/>
+            <a:ext cx="11125236" cy="1104900"/>
+          </a:xfrm>
+        </p:spPr>
+        <p:txBody>
+          <a:bodyPr/>
+          <a:lstStyle/>
+          <a:p>
+            <a:r>
+              <a:rPr lang="en-US" dirty="0"/>
+              <a:t>import this: building your first python package</a:t>
+            </a:r>
+          </a:p>
+        </p:txBody>
+      </p:sp>
+      <p:sp>
+        <p:nvSpPr>
+          <p:cNvPr id="6" name="Text Placeholder 5"/>
+          <p:cNvSpPr>
+            <a:spLocks noGrp="1"/>
+          </p:cNvSpPr>
+          <p:nvPr>
+            <p:ph type="body" sz="quarter" idx="11"/>
+          </p:nvPr>
+        </p:nvSpPr>
+        <p:spPr/>
+        <p:txBody>
+          <a:bodyPr/>
+          <a:lstStyle/>
+          <a:p>
+            <a:r>
+              <a:rPr lang="en-GB" dirty="0"/>
+              <a:t>An overview of today</a:t>
+            </a:r>
+          </a:p>
+        </p:txBody>
+      </p:sp>
+      <p:pic>
+        <p:nvPicPr>
+          <p:cNvPr id="3" name="Picture 2" descr="Icon&#10;&#10;Description automatically generated">
+            <a:extLst>
+              <a:ext uri="{FF2B5EF4-FFF2-40B4-BE49-F238E27FC236}">
+                <a16:creationId xmlns:a16="http://schemas.microsoft.com/office/drawing/2014/main" id="{6082D4AC-5102-413D-BA6F-480AAECF013A}"/>
+              </a:ext>
+            </a:extLst>
+          </p:cNvPr>
+          <p:cNvPicPr>
+            <a:picLocks noChangeAspect="1"/>
+          </p:cNvPicPr>
+          <p:nvPr/>
+        </p:nvPicPr>
+        <p:blipFill>
+          <a:blip r:embed="rId3">
+            <a:extLst>
+              <a:ext uri="{28A0092B-C50C-407E-A947-70E740481C1C}">
+                <a14:useLocalDpi xmlns:a14="http://schemas.microsoft.com/office/drawing/2010/main" val="0"/>
+              </a:ext>
+            </a:extLst>
+          </a:blip>
+          <a:stretch>
+            <a:fillRect/>
+          </a:stretch>
+        </p:blipFill>
+        <p:spPr>
+          <a:xfrm>
+            <a:off x="912000" y="3157757"/>
+            <a:ext cx="1296000" cy="1296000"/>
+          </a:xfrm>
+          <a:prstGeom prst="rect">
+            <a:avLst/>
+          </a:prstGeom>
+        </p:spPr>
+      </p:pic>
+      <p:pic>
+        <p:nvPicPr>
+          <p:cNvPr id="68610" name="Picture 2">
+            <a:extLst>
+              <a:ext uri="{FF2B5EF4-FFF2-40B4-BE49-F238E27FC236}">
+                <a16:creationId xmlns:a16="http://schemas.microsoft.com/office/drawing/2014/main" id="{698A9810-4D47-4AEA-8B82-86D9636CD0F3}"/>
+              </a:ext>
+            </a:extLst>
+          </p:cNvPr>
+          <p:cNvPicPr>
+            <a:picLocks noChangeAspect="1" noChangeArrowheads="1"/>
+          </p:cNvPicPr>
+          <p:nvPr/>
+        </p:nvPicPr>
+        <p:blipFill rotWithShape="1">
+          <a:blip r:embed="rId4">
+            <a:extLst>
+              <a:ext uri="{28A0092B-C50C-407E-A947-70E740481C1C}">
+                <a14:useLocalDpi xmlns:a14="http://schemas.microsoft.com/office/drawing/2010/main" val="0"/>
+              </a:ext>
+            </a:extLst>
+          </a:blip>
+          <a:srcRect l="21260" t="7717" r="22045" b="31495"/>
+          <a:stretch/>
+        </p:blipFill>
+        <p:spPr bwMode="auto">
+          <a:xfrm>
+            <a:off x="3399503" y="2879357"/>
+            <a:ext cx="1728000" cy="1852801"/>
+          </a:xfrm>
+          <a:prstGeom prst="rect">
+            <a:avLst/>
+          </a:prstGeom>
+          <a:noFill/>
+          <a:extLst>
+            <a:ext uri="{909E8E84-426E-40DD-AFC4-6F175D3DCCD1}">
+              <a14:hiddenFill xmlns:a14="http://schemas.microsoft.com/office/drawing/2010/main">
+                <a:solidFill>
+                  <a:srgbClr val="FFFFFF"/>
+                </a:solidFill>
+              </a14:hiddenFill>
+            </a:ext>
+          </a:extLst>
+        </p:spPr>
+      </p:pic>
+      <p:pic>
+        <p:nvPicPr>
+          <p:cNvPr id="5" name="Picture 10" descr="https://www.younggates.com/uploads/1547662972python2.png">
+            <a:extLst>
+              <a:ext uri="{FF2B5EF4-FFF2-40B4-BE49-F238E27FC236}">
+                <a16:creationId xmlns:a16="http://schemas.microsoft.com/office/drawing/2014/main" id="{1BE76E22-6C25-488F-A2D2-202E15B8DE90}"/>
+              </a:ext>
+            </a:extLst>
+          </p:cNvPr>
+          <p:cNvPicPr>
+            <a:picLocks noChangeAspect="1" noChangeArrowheads="1"/>
+          </p:cNvPicPr>
+          <p:nvPr/>
+        </p:nvPicPr>
+        <p:blipFill rotWithShape="1">
+          <a:blip r:embed="rId5">
+            <a:extLst>
+              <a:ext uri="{28A0092B-C50C-407E-A947-70E740481C1C}">
+                <a14:useLocalDpi xmlns:a14="http://schemas.microsoft.com/office/drawing/2010/main" val="0"/>
+              </a:ext>
+            </a:extLst>
+          </a:blip>
+          <a:srcRect l="25650" r="23058"/>
+          <a:stretch/>
+        </p:blipFill>
+        <p:spPr bwMode="auto">
+          <a:xfrm>
+            <a:off x="6319006" y="3091456"/>
+            <a:ext cx="1465491" cy="1428602"/>
+          </a:xfrm>
+          <a:prstGeom prst="rect">
+            <a:avLst/>
+          </a:prstGeom>
+          <a:noFill/>
+          <a:extLst>
+            <a:ext uri="{909E8E84-426E-40DD-AFC4-6F175D3DCCD1}">
+              <a14:hiddenFill xmlns:a14="http://schemas.microsoft.com/office/drawing/2010/main">
+                <a:solidFill>
+                  <a:srgbClr val="FFFFFF"/>
+                </a:solidFill>
+              </a14:hiddenFill>
+            </a:ext>
+          </a:extLst>
+        </p:spPr>
+      </p:pic>
+      <p:pic>
+        <p:nvPicPr>
+          <p:cNvPr id="68612" name="Picture 4">
+            <a:extLst>
+              <a:ext uri="{FF2B5EF4-FFF2-40B4-BE49-F238E27FC236}">
+                <a16:creationId xmlns:a16="http://schemas.microsoft.com/office/drawing/2014/main" id="{127A8003-FE9F-4EA4-99DD-A9FCF12AC114}"/>
+              </a:ext>
+            </a:extLst>
+          </p:cNvPr>
+          <p:cNvPicPr>
+            <a:picLocks noChangeAspect="1" noChangeArrowheads="1"/>
+          </p:cNvPicPr>
+          <p:nvPr/>
+        </p:nvPicPr>
+        <p:blipFill>
+          <a:blip r:embed="rId6">
+            <a:extLst>
+              <a:ext uri="{28A0092B-C50C-407E-A947-70E740481C1C}">
+                <a14:useLocalDpi xmlns:a14="http://schemas.microsoft.com/office/drawing/2010/main" val="0"/>
+              </a:ext>
+            </a:extLst>
+          </a:blip>
+          <a:srcRect/>
+          <a:stretch>
+            <a:fillRect/>
+          </a:stretch>
+        </p:blipFill>
+        <p:spPr bwMode="auto">
+          <a:xfrm>
+            <a:off x="8976000" y="2868857"/>
+            <a:ext cx="1873800" cy="1873800"/>
+          </a:xfrm>
+          <a:prstGeom prst="rect">
+            <a:avLst/>
+          </a:prstGeom>
+          <a:noFill/>
+          <a:extLst>
+            <a:ext uri="{909E8E84-426E-40DD-AFC4-6F175D3DCCD1}">
+              <a14:hiddenFill xmlns:a14="http://schemas.microsoft.com/office/drawing/2010/main">
+                <a:solidFill>
+                  <a:srgbClr val="FFFFFF"/>
+                </a:solidFill>
+              </a14:hiddenFill>
+            </a:ext>
+          </a:extLst>
+        </p:spPr>
+      </p:pic>
+      <p:cxnSp>
+        <p:nvCxnSpPr>
+          <p:cNvPr id="10" name="Straight Arrow Connector 9">
+            <a:extLst>
+              <a:ext uri="{FF2B5EF4-FFF2-40B4-BE49-F238E27FC236}">
+                <a16:creationId xmlns:a16="http://schemas.microsoft.com/office/drawing/2014/main" id="{BC4D3116-9E58-4D3B-8497-4EAA8DA99651}"/>
+              </a:ext>
+            </a:extLst>
+          </p:cNvPr>
+          <p:cNvCxnSpPr>
+            <a:cxnSpLocks/>
+          </p:cNvCxnSpPr>
+          <p:nvPr/>
+        </p:nvCxnSpPr>
+        <p:spPr>
+          <a:xfrm>
+            <a:off x="2496000" y="3789000"/>
+            <a:ext cx="936000" cy="0"/>
+          </a:xfrm>
+          <a:prstGeom prst="straightConnector1">
+            <a:avLst/>
+          </a:prstGeom>
+          <a:ln w="76200">
+            <a:solidFill>
+              <a:srgbClr val="4701A7"/>
+            </a:solidFill>
+            <a:tailEnd type="triangle"/>
+          </a:ln>
+        </p:spPr>
+        <p:style>
+          <a:lnRef idx="1">
+            <a:schemeClr val="accent1"/>
+          </a:lnRef>
+          <a:fillRef idx="0">
+            <a:schemeClr val="accent1"/>
+          </a:fillRef>
+          <a:effectRef idx="0">
+            <a:schemeClr val="accent1"/>
+          </a:effectRef>
+          <a:fontRef idx="minor">
+            <a:schemeClr val="tx1"/>
+          </a:fontRef>
+        </p:style>
+      </p:cxnSp>
+      <p:cxnSp>
+        <p:nvCxnSpPr>
+          <p:cNvPr id="11" name="Straight Arrow Connector 10">
+            <a:extLst>
+              <a:ext uri="{FF2B5EF4-FFF2-40B4-BE49-F238E27FC236}">
+                <a16:creationId xmlns:a16="http://schemas.microsoft.com/office/drawing/2014/main" id="{065CAD99-A58D-49BE-A1E5-F7F3E5B6F993}"/>
+              </a:ext>
+            </a:extLst>
+          </p:cNvPr>
+          <p:cNvCxnSpPr>
+            <a:cxnSpLocks/>
+          </p:cNvCxnSpPr>
+          <p:nvPr/>
+        </p:nvCxnSpPr>
+        <p:spPr>
+          <a:xfrm>
+            <a:off x="5232000" y="3789000"/>
+            <a:ext cx="936000" cy="0"/>
+          </a:xfrm>
+          <a:prstGeom prst="straightConnector1">
+            <a:avLst/>
+          </a:prstGeom>
+          <a:ln w="76200">
+            <a:solidFill>
+              <a:srgbClr val="4701A7"/>
+            </a:solidFill>
+            <a:tailEnd type="triangle"/>
+          </a:ln>
+        </p:spPr>
+        <p:style>
+          <a:lnRef idx="1">
+            <a:schemeClr val="accent1"/>
+          </a:lnRef>
+          <a:fillRef idx="0">
+            <a:schemeClr val="accent1"/>
+          </a:fillRef>
+          <a:effectRef idx="0">
+            <a:schemeClr val="accent1"/>
+          </a:effectRef>
+          <a:fontRef idx="minor">
+            <a:schemeClr val="tx1"/>
+          </a:fontRef>
+        </p:style>
+      </p:cxnSp>
+      <p:cxnSp>
+        <p:nvCxnSpPr>
+          <p:cNvPr id="12" name="Straight Arrow Connector 11">
+            <a:extLst>
+              <a:ext uri="{FF2B5EF4-FFF2-40B4-BE49-F238E27FC236}">
+                <a16:creationId xmlns:a16="http://schemas.microsoft.com/office/drawing/2014/main" id="{4AC984CF-4C78-4A82-AE49-FF4C8B42CF94}"/>
+              </a:ext>
+            </a:extLst>
+          </p:cNvPr>
+          <p:cNvCxnSpPr>
+            <a:cxnSpLocks/>
+          </p:cNvCxnSpPr>
+          <p:nvPr/>
+        </p:nvCxnSpPr>
+        <p:spPr>
+          <a:xfrm>
+            <a:off x="8040000" y="3789000"/>
+            <a:ext cx="936000" cy="0"/>
+          </a:xfrm>
+          <a:prstGeom prst="straightConnector1">
+            <a:avLst/>
+          </a:prstGeom>
+          <a:ln w="76200">
+            <a:solidFill>
+              <a:srgbClr val="4701A7"/>
+            </a:solidFill>
+            <a:tailEnd type="triangle"/>
+          </a:ln>
+        </p:spPr>
+        <p:style>
+          <a:lnRef idx="1">
+            <a:schemeClr val="accent1"/>
+          </a:lnRef>
+          <a:fillRef idx="0">
+            <a:schemeClr val="accent1"/>
+          </a:fillRef>
+          <a:effectRef idx="0">
+            <a:schemeClr val="accent1"/>
+          </a:effectRef>
+          <a:fontRef idx="minor">
+            <a:schemeClr val="tx1"/>
+          </a:fontRef>
+        </p:style>
+      </p:cxnSp>
+    </p:spTree>
+    <p:extLst>
+      <p:ext uri="{BB962C8B-B14F-4D97-AF65-F5344CB8AC3E}">
+        <p14:creationId xmlns:p14="http://schemas.microsoft.com/office/powerpoint/2010/main" val="3348113440"/>
+      </p:ext>
+    </p:extLst>
+  </p:cSld>
+  <p:clrMapOvr>
+    <a:masterClrMapping/>
+  </p:clrMapOvr>
+</p:sld>
+</file>
+
+<file path=ppt/slides/slide5.xml><?xml version="1.0" encoding="utf-8"?>
 <p:sld xmlns:a="http://schemas.openxmlformats.org/drawingml/2006/main" xmlns:r="http://schemas.openxmlformats.org/officeDocument/2006/relationships" xmlns:p="http://schemas.openxmlformats.org/presentationml/2006/main">
   <p:cSld>
     <p:spTree>
@@ -39833,7 +41604,7 @@
 </p:sld>
 </file>
 
-<file path=ppt/slides/slide5.xml><?xml version="1.0" encoding="utf-8"?>
+<file path=ppt/slides/slide6.xml><?xml version="1.0" encoding="utf-8"?>
 <p:sld xmlns:a="http://schemas.openxmlformats.org/drawingml/2006/main" xmlns:r="http://schemas.openxmlformats.org/officeDocument/2006/relationships" xmlns:p="http://schemas.openxmlformats.org/presentationml/2006/main">
   <p:cSld>
     <p:spTree>
@@ -39948,7 +41719,7 @@
 </p:sld>
 </file>
 
-<file path=ppt/slides/slide6.xml><?xml version="1.0" encoding="utf-8"?>
+<file path=ppt/slides/slide7.xml><?xml version="1.0" encoding="utf-8"?>
 <p:sld xmlns:a="http://schemas.openxmlformats.org/drawingml/2006/main" xmlns:r="http://schemas.openxmlformats.org/officeDocument/2006/relationships" xmlns:p="http://schemas.openxmlformats.org/presentationml/2006/main">
   <p:cSld>
     <p:spTree>
@@ -40464,7 +42235,7 @@
 </p:sld>
 </file>
 
-<file path=ppt/slides/slide7.xml><?xml version="1.0" encoding="utf-8"?>
+<file path=ppt/slides/slide8.xml><?xml version="1.0" encoding="utf-8"?>
 <p:sld xmlns:a="http://schemas.openxmlformats.org/drawingml/2006/main" xmlns:r="http://schemas.openxmlformats.org/officeDocument/2006/relationships" xmlns:p="http://schemas.openxmlformats.org/presentationml/2006/main">
   <p:cSld>
     <p:spTree>
@@ -42926,7 +44697,7 @@
 </p:sld>
 </file>
 
-<file path=ppt/slides/slide8.xml><?xml version="1.0" encoding="utf-8"?>
+<file path=ppt/slides/slide9.xml><?xml version="1.0" encoding="utf-8"?>
 <p:sld xmlns:a="http://schemas.openxmlformats.org/drawingml/2006/main" xmlns:r="http://schemas.openxmlformats.org/officeDocument/2006/relationships" xmlns:p="http://schemas.openxmlformats.org/presentationml/2006/main">
   <p:cSld>
     <p:spTree>
@@ -43082,371 +44853,6 @@
     <p:extLst>
       <p:ext uri="{BB962C8B-B14F-4D97-AF65-F5344CB8AC3E}">
         <p14:creationId xmlns:p14="http://schemas.microsoft.com/office/powerpoint/2010/main" val="799346114"/>
-      </p:ext>
-    </p:extLst>
-  </p:cSld>
-  <p:clrMapOvr>
-    <a:masterClrMapping/>
-  </p:clrMapOvr>
-</p:sld>
-</file>
-
-<file path=ppt/slides/slide9.xml><?xml version="1.0" encoding="utf-8"?>
-<p:sld xmlns:a="http://schemas.openxmlformats.org/drawingml/2006/main" xmlns:r="http://schemas.openxmlformats.org/officeDocument/2006/relationships" xmlns:p="http://schemas.openxmlformats.org/presentationml/2006/main">
-  <p:cSld>
-    <p:spTree>
-      <p:nvGrpSpPr>
-        <p:cNvPr id="1" name=""/>
-        <p:cNvGrpSpPr/>
-        <p:nvPr/>
-      </p:nvGrpSpPr>
-      <p:grpSpPr>
-        <a:xfrm>
-          <a:off x="0" y="0"/>
-          <a:ext cx="0" cy="0"/>
-          <a:chOff x="0" y="0"/>
-          <a:chExt cx="0" cy="0"/>
-        </a:xfrm>
-      </p:grpSpPr>
-      <p:sp>
-        <p:nvSpPr>
-          <p:cNvPr id="4" name="Title 3"/>
-          <p:cNvSpPr>
-            <a:spLocks noGrp="1"/>
-          </p:cNvSpPr>
-          <p:nvPr>
-            <p:ph type="title"/>
-          </p:nvPr>
-        </p:nvSpPr>
-        <p:spPr>
-          <a:xfrm>
-            <a:off x="227349" y="0"/>
-            <a:ext cx="11125236" cy="1104900"/>
-          </a:xfrm>
-        </p:spPr>
-        <p:txBody>
-          <a:bodyPr/>
-          <a:lstStyle/>
-          <a:p>
-            <a:br>
-              <a:rPr lang="en-US" dirty="0"/>
-            </a:br>
-            <a:r>
-              <a:rPr lang="en-US" dirty="0"/>
-              <a:t>First things first</a:t>
-            </a:r>
-            <a:endParaRPr lang="en-GB" dirty="0"/>
-          </a:p>
-        </p:txBody>
-      </p:sp>
-      <p:sp>
-        <p:nvSpPr>
-          <p:cNvPr id="6" name="Text Placeholder 5"/>
-          <p:cNvSpPr>
-            <a:spLocks noGrp="1"/>
-          </p:cNvSpPr>
-          <p:nvPr>
-            <p:ph type="body" sz="quarter" idx="11"/>
-          </p:nvPr>
-        </p:nvSpPr>
-        <p:spPr/>
-        <p:txBody>
-          <a:bodyPr/>
-          <a:lstStyle/>
-          <a:p>
-            <a:r>
-              <a:rPr lang="en-GB" dirty="0"/>
-              <a:t>Set up our project</a:t>
-            </a:r>
-          </a:p>
-        </p:txBody>
-      </p:sp>
-      <p:pic>
-        <p:nvPicPr>
-          <p:cNvPr id="3" name="Picture 2" descr="Icon&#10;&#10;Description automatically generated">
-            <a:extLst>
-              <a:ext uri="{FF2B5EF4-FFF2-40B4-BE49-F238E27FC236}">
-                <a16:creationId xmlns:a16="http://schemas.microsoft.com/office/drawing/2014/main" id="{84E7A233-F750-4377-93D6-75D3CED4AC30}"/>
-              </a:ext>
-            </a:extLst>
-          </p:cNvPr>
-          <p:cNvPicPr>
-            <a:picLocks noChangeAspect="1"/>
-          </p:cNvPicPr>
-          <p:nvPr/>
-        </p:nvPicPr>
-        <p:blipFill>
-          <a:blip r:embed="rId3">
-            <a:extLst>
-              <a:ext uri="{28A0092B-C50C-407E-A947-70E740481C1C}">
-                <a14:useLocalDpi xmlns:a14="http://schemas.microsoft.com/office/drawing/2010/main" val="0"/>
-              </a:ext>
-            </a:extLst>
-          </a:blip>
-          <a:stretch>
-            <a:fillRect/>
-          </a:stretch>
-        </p:blipFill>
-        <p:spPr>
-          <a:xfrm>
-            <a:off x="912000" y="1845000"/>
-            <a:ext cx="1296000" cy="1296000"/>
-          </a:xfrm>
-          <a:prstGeom prst="rect">
-            <a:avLst/>
-          </a:prstGeom>
-        </p:spPr>
-      </p:pic>
-      <p:sp>
-        <p:nvSpPr>
-          <p:cNvPr id="7" name="TextBox 6">
-            <a:extLst>
-              <a:ext uri="{FF2B5EF4-FFF2-40B4-BE49-F238E27FC236}">
-                <a16:creationId xmlns:a16="http://schemas.microsoft.com/office/drawing/2014/main" id="{98173C9A-BC3F-4AAF-B1DF-EBCB8FEB9D9F}"/>
-              </a:ext>
-            </a:extLst>
-          </p:cNvPr>
-          <p:cNvSpPr txBox="1"/>
-          <p:nvPr/>
-        </p:nvSpPr>
-        <p:spPr>
-          <a:xfrm>
-            <a:off x="3360000" y="1845000"/>
-            <a:ext cx="7704000" cy="1754326"/>
-          </a:xfrm>
-          <a:prstGeom prst="rect">
-            <a:avLst/>
-          </a:prstGeom>
-          <a:noFill/>
-        </p:spPr>
-        <p:txBody>
-          <a:bodyPr wrap="square" rtlCol="0">
-            <a:spAutoFit/>
-          </a:bodyPr>
-          <a:lstStyle/>
-          <a:p>
-            <a:r>
-              <a:rPr lang="en-GB" dirty="0"/>
-              <a:t>Firstly, create a git project:</a:t>
-            </a:r>
-          </a:p>
-          <a:p>
-            <a:pPr marL="742950" lvl="1" indent="-285750">
-              <a:buFont typeface="Arial" panose="020B0604020202020204" pitchFamily="34" charset="0"/>
-              <a:buChar char="•"/>
-            </a:pPr>
-            <a:r>
-              <a:rPr lang="en-GB" dirty="0"/>
-              <a:t>Choose a git host (I’m going to choose GitHub)</a:t>
-            </a:r>
-          </a:p>
-          <a:p>
-            <a:pPr marL="742950" lvl="1" indent="-285750">
-              <a:buFont typeface="Arial" panose="020B0604020202020204" pitchFamily="34" charset="0"/>
-              <a:buChar char="•"/>
-            </a:pPr>
-            <a:r>
-              <a:rPr lang="en-GB" dirty="0"/>
-              <a:t>Create a very basic readme</a:t>
-            </a:r>
-          </a:p>
-          <a:p>
-            <a:pPr marL="742950" lvl="1" indent="-285750">
-              <a:buFont typeface="Arial" panose="020B0604020202020204" pitchFamily="34" charset="0"/>
-              <a:buChar char="•"/>
-            </a:pPr>
-            <a:r>
-              <a:rPr lang="en-GB" dirty="0"/>
-              <a:t>Choose a licence (I’m going to choose the MIT licence)</a:t>
-            </a:r>
-          </a:p>
-          <a:p>
-            <a:pPr marL="742950" lvl="1" indent="-285750">
-              <a:buFont typeface="Arial" panose="020B0604020202020204" pitchFamily="34" charset="0"/>
-              <a:buChar char="•"/>
-            </a:pPr>
-            <a:r>
-              <a:rPr lang="en-GB" dirty="0"/>
-              <a:t>Pull git project into my local</a:t>
-            </a:r>
-          </a:p>
-          <a:p>
-            <a:pPr marL="742950" lvl="1" indent="-285750">
-              <a:buFont typeface="Arial" panose="020B0604020202020204" pitchFamily="34" charset="0"/>
-              <a:buChar char="•"/>
-            </a:pPr>
-            <a:endParaRPr lang="en-AU" dirty="0"/>
-          </a:p>
-        </p:txBody>
-      </p:sp>
-      <p:pic>
-        <p:nvPicPr>
-          <p:cNvPr id="9" name="Picture 10" descr="https://www.younggates.com/uploads/1547662972python2.png">
-            <a:extLst>
-              <a:ext uri="{FF2B5EF4-FFF2-40B4-BE49-F238E27FC236}">
-                <a16:creationId xmlns:a16="http://schemas.microsoft.com/office/drawing/2014/main" id="{BA351A28-7E44-48C0-BCEC-79CCB0BA2036}"/>
-              </a:ext>
-            </a:extLst>
-          </p:cNvPr>
-          <p:cNvPicPr>
-            <a:picLocks noChangeAspect="1" noChangeArrowheads="1"/>
-          </p:cNvPicPr>
-          <p:nvPr/>
-        </p:nvPicPr>
-        <p:blipFill rotWithShape="1">
-          <a:blip r:embed="rId4">
-            <a:extLst>
-              <a:ext uri="{28A0092B-C50C-407E-A947-70E740481C1C}">
-                <a14:useLocalDpi xmlns:a14="http://schemas.microsoft.com/office/drawing/2010/main" val="0"/>
-              </a:ext>
-            </a:extLst>
-          </a:blip>
-          <a:srcRect l="25650" r="23058"/>
-          <a:stretch/>
-        </p:blipFill>
-        <p:spPr bwMode="auto">
-          <a:xfrm>
-            <a:off x="984000" y="4280791"/>
-            <a:ext cx="1465491" cy="1428602"/>
-          </a:xfrm>
-          <a:prstGeom prst="rect">
-            <a:avLst/>
-          </a:prstGeom>
-          <a:noFill/>
-          <a:extLst>
-            <a:ext uri="{909E8E84-426E-40DD-AFC4-6F175D3DCCD1}">
-              <a14:hiddenFill xmlns:a14="http://schemas.microsoft.com/office/drawing/2010/main">
-                <a:solidFill>
-                  <a:srgbClr val="FFFFFF"/>
-                </a:solidFill>
-              </a14:hiddenFill>
-            </a:ext>
-          </a:extLst>
-        </p:spPr>
-      </p:pic>
-      <p:sp>
-        <p:nvSpPr>
-          <p:cNvPr id="64" name="TextBox 63">
-            <a:extLst>
-              <a:ext uri="{FF2B5EF4-FFF2-40B4-BE49-F238E27FC236}">
-                <a16:creationId xmlns:a16="http://schemas.microsoft.com/office/drawing/2014/main" id="{7DE9B2A5-0683-42C1-AC2C-AC3FA3C31BC1}"/>
-              </a:ext>
-            </a:extLst>
-          </p:cNvPr>
-          <p:cNvSpPr txBox="1"/>
-          <p:nvPr/>
-        </p:nvSpPr>
-        <p:spPr>
-          <a:xfrm>
-            <a:off x="3360000" y="4117929"/>
-            <a:ext cx="7704000" cy="1754326"/>
-          </a:xfrm>
-          <a:prstGeom prst="rect">
-            <a:avLst/>
-          </a:prstGeom>
-          <a:noFill/>
-        </p:spPr>
-        <p:txBody>
-          <a:bodyPr wrap="square" rtlCol="0">
-            <a:spAutoFit/>
-          </a:bodyPr>
-          <a:lstStyle/>
-          <a:p>
-            <a:r>
-              <a:rPr lang="en-GB" dirty="0"/>
-              <a:t>Secondly, set up a virtual environment:</a:t>
-            </a:r>
-          </a:p>
-          <a:p>
-            <a:pPr marL="742950" lvl="1" indent="-285750">
-              <a:buFont typeface="Arial" panose="020B0604020202020204" pitchFamily="34" charset="0"/>
-              <a:buChar char="•"/>
-            </a:pPr>
-            <a:r>
-              <a:rPr lang="en-GB" dirty="0"/>
-              <a:t>This is a very good idea for any new python project and it will help you understand the minimum requirements that your new project will require for other machines.</a:t>
-            </a:r>
-          </a:p>
-          <a:p>
-            <a:pPr marL="742950" lvl="1" indent="-285750">
-              <a:buFont typeface="Arial" panose="020B0604020202020204" pitchFamily="34" charset="0"/>
-              <a:buChar char="•"/>
-            </a:pPr>
-            <a:endParaRPr lang="en-GB" dirty="0"/>
-          </a:p>
-          <a:p>
-            <a:pPr marL="742950" lvl="1" indent="-285750">
-              <a:buFont typeface="Arial" panose="020B0604020202020204" pitchFamily="34" charset="0"/>
-              <a:buChar char="•"/>
-            </a:pPr>
-            <a:endParaRPr lang="en-AU" dirty="0"/>
-          </a:p>
-        </p:txBody>
-      </p:sp>
-      <p:pic>
-        <p:nvPicPr>
-          <p:cNvPr id="66" name="Picture 65">
-            <a:extLst>
-              <a:ext uri="{FF2B5EF4-FFF2-40B4-BE49-F238E27FC236}">
-                <a16:creationId xmlns:a16="http://schemas.microsoft.com/office/drawing/2014/main" id="{41E493CA-4316-4639-A900-51DDA93A6801}"/>
-              </a:ext>
-            </a:extLst>
-          </p:cNvPr>
-          <p:cNvPicPr>
-            <a:picLocks noChangeAspect="1"/>
-          </p:cNvPicPr>
-          <p:nvPr/>
-        </p:nvPicPr>
-        <p:blipFill>
-          <a:blip r:embed="rId5"/>
-          <a:stretch>
-            <a:fillRect/>
-          </a:stretch>
-        </p:blipFill>
-        <p:spPr>
-          <a:xfrm>
-            <a:off x="4108570" y="5463735"/>
-            <a:ext cx="3362794" cy="238158"/>
-          </a:xfrm>
-          <a:prstGeom prst="rect">
-            <a:avLst/>
-          </a:prstGeom>
-        </p:spPr>
-      </p:pic>
-      <p:pic>
-        <p:nvPicPr>
-          <p:cNvPr id="68" name="Picture 67">
-            <a:extLst>
-              <a:ext uri="{FF2B5EF4-FFF2-40B4-BE49-F238E27FC236}">
-                <a16:creationId xmlns:a16="http://schemas.microsoft.com/office/drawing/2014/main" id="{013CBD8A-455A-43BF-9EC4-896D1AF7D011}"/>
-              </a:ext>
-            </a:extLst>
-          </p:cNvPr>
-          <p:cNvPicPr>
-            <a:picLocks noChangeAspect="1"/>
-          </p:cNvPicPr>
-          <p:nvPr/>
-        </p:nvPicPr>
-        <p:blipFill>
-          <a:blip r:embed="rId6"/>
-          <a:stretch>
-            <a:fillRect/>
-          </a:stretch>
-        </p:blipFill>
-        <p:spPr>
-          <a:xfrm>
-            <a:off x="4108570" y="5805000"/>
-            <a:ext cx="3600953" cy="695422"/>
-          </a:xfrm>
-          <a:prstGeom prst="rect">
-            <a:avLst/>
-          </a:prstGeom>
-        </p:spPr>
-      </p:pic>
-    </p:spTree>
-    <p:extLst>
-      <p:ext uri="{BB962C8B-B14F-4D97-AF65-F5344CB8AC3E}">
-        <p14:creationId xmlns:p14="http://schemas.microsoft.com/office/powerpoint/2010/main" val="2005609057"/>
       </p:ext>
     </p:extLst>
   </p:cSld>

</xml_diff>